<commit_message>
Slajdy o kolekcjach i workspacie.
</commit_message>
<xml_diff>
--- a/Postman.pptx
+++ b/Postman.pptx
@@ -4,36 +4,41 @@
   <p:sldMasterIdLst>
     <p:sldMasterId id="2147483648" r:id="rId1"/>
   </p:sldMasterIdLst>
+  <p:notesMasterIdLst>
+    <p:notesMasterId r:id="rId8"/>
+  </p:notesMasterIdLst>
   <p:sldIdLst>
     <p:sldId id="256" r:id="rId2"/>
     <p:sldId id="257" r:id="rId3"/>
     <p:sldId id="258" r:id="rId4"/>
-    <p:sldId id="259" r:id="rId5"/>
+    <p:sldId id="260" r:id="rId5"/>
+    <p:sldId id="261" r:id="rId6"/>
+    <p:sldId id="259" r:id="rId7"/>
   </p:sldIdLst>
   <p:sldSz cx="12192000" cy="6858000"/>
   <p:notesSz cx="6858000" cy="9144000"/>
   <p:embeddedFontLst>
     <p:embeddedFont>
       <p:font typeface="Calibri" panose="020F0502020204030204" pitchFamily="34" charset="0"/>
-      <p:regular r:id="rId6"/>
-      <p:bold r:id="rId7"/>
-      <p:italic r:id="rId8"/>
-      <p:boldItalic r:id="rId9"/>
+      <p:regular r:id="rId9"/>
+      <p:bold r:id="rId10"/>
+      <p:italic r:id="rId11"/>
+      <p:boldItalic r:id="rId12"/>
     </p:embeddedFont>
     <p:embeddedFont>
       <p:font typeface="Calibri Light" panose="020F0302020204030204" pitchFamily="34" charset="0"/>
-      <p:regular r:id="rId10"/>
-      <p:italic r:id="rId11"/>
+      <p:regular r:id="rId13"/>
+      <p:italic r:id="rId14"/>
     </p:embeddedFont>
     <p:embeddedFont>
       <p:font typeface="Roboto Light" panose="02000000000000000000" pitchFamily="2" charset="0"/>
-      <p:regular r:id="rId12"/>
-      <p:italic r:id="rId13"/>
+      <p:regular r:id="rId15"/>
+      <p:italic r:id="rId16"/>
     </p:embeddedFont>
     <p:embeddedFont>
       <p:font typeface="Roboto Medium" panose="02000000000000000000" pitchFamily="2" charset="0"/>
-      <p:regular r:id="rId14"/>
-      <p:italic r:id="rId15"/>
+      <p:regular r:id="rId17"/>
+      <p:italic r:id="rId18"/>
     </p:embeddedFont>
   </p:embeddedFontLst>
   <p:defaultTextStyle>
@@ -139,6 +144,482 @@
 </p:presentation>
 </file>
 
+<file path=ppt/commentAuthors.xml><?xml version="1.0" encoding="utf-8"?>
+<p:cmAuthorLst xmlns:a="http://schemas.openxmlformats.org/drawingml/2006/main" xmlns:r="http://schemas.openxmlformats.org/officeDocument/2006/relationships" xmlns:p="http://schemas.openxmlformats.org/presentationml/2006/main">
+  <p:cmAuthor id="1" name="Jarosław Jusiak" initials="JJ" lastIdx="1" clrIdx="0">
+    <p:extLst>
+      <p:ext uri="{19B8F6BF-5375-455C-9EA6-DF929625EA0E}">
+        <p15:presenceInfo xmlns:p15="http://schemas.microsoft.com/office/powerpoint/2012/main" userId="ec49fec8fe47e6dc" providerId="Windows Live"/>
+      </p:ext>
+    </p:extLst>
+  </p:cmAuthor>
+</p:cmAuthorLst>
+</file>
+
+<file path=ppt/notesMasters/notesMaster1.xml><?xml version="1.0" encoding="utf-8"?>
+<p:notesMaster xmlns:a="http://schemas.openxmlformats.org/drawingml/2006/main" xmlns:r="http://schemas.openxmlformats.org/officeDocument/2006/relationships" xmlns:p="http://schemas.openxmlformats.org/presentationml/2006/main">
+  <p:cSld>
+    <p:bg>
+      <p:bgRef idx="1001">
+        <a:schemeClr val="bg1"/>
+      </p:bgRef>
+    </p:bg>
+    <p:spTree>
+      <p:nvGrpSpPr>
+        <p:cNvPr id="1" name=""/>
+        <p:cNvGrpSpPr/>
+        <p:nvPr/>
+      </p:nvGrpSpPr>
+      <p:grpSpPr>
+        <a:xfrm>
+          <a:off x="0" y="0"/>
+          <a:ext cx="0" cy="0"/>
+          <a:chOff x="0" y="0"/>
+          <a:chExt cx="0" cy="0"/>
+        </a:xfrm>
+      </p:grpSpPr>
+      <p:sp>
+        <p:nvSpPr>
+          <p:cNvPr id="2" name="Symbol zastępczy nagłówka 1"/>
+          <p:cNvSpPr>
+            <a:spLocks noGrp="1"/>
+          </p:cNvSpPr>
+          <p:nvPr>
+            <p:ph type="hdr" sz="quarter"/>
+          </p:nvPr>
+        </p:nvSpPr>
+        <p:spPr>
+          <a:xfrm>
+            <a:off x="0" y="0"/>
+            <a:ext cx="2971800" cy="458788"/>
+          </a:xfrm>
+          <a:prstGeom prst="rect">
+            <a:avLst/>
+          </a:prstGeom>
+        </p:spPr>
+        <p:txBody>
+          <a:bodyPr vert="horz" lIns="91440" tIns="45720" rIns="91440" bIns="45720" rtlCol="0"/>
+          <a:lstStyle>
+            <a:lvl1pPr algn="l">
+              <a:defRPr sz="1200"/>
+            </a:lvl1pPr>
+          </a:lstStyle>
+          <a:p>
+            <a:endParaRPr lang="pl-PL"/>
+          </a:p>
+        </p:txBody>
+      </p:sp>
+      <p:sp>
+        <p:nvSpPr>
+          <p:cNvPr id="3" name="Symbol zastępczy daty 2"/>
+          <p:cNvSpPr>
+            <a:spLocks noGrp="1"/>
+          </p:cNvSpPr>
+          <p:nvPr>
+            <p:ph type="dt" idx="1"/>
+          </p:nvPr>
+        </p:nvSpPr>
+        <p:spPr>
+          <a:xfrm>
+            <a:off x="3884613" y="0"/>
+            <a:ext cx="2971800" cy="458788"/>
+          </a:xfrm>
+          <a:prstGeom prst="rect">
+            <a:avLst/>
+          </a:prstGeom>
+        </p:spPr>
+        <p:txBody>
+          <a:bodyPr vert="horz" lIns="91440" tIns="45720" rIns="91440" bIns="45720" rtlCol="0"/>
+          <a:lstStyle>
+            <a:lvl1pPr algn="r">
+              <a:defRPr sz="1200"/>
+            </a:lvl1pPr>
+          </a:lstStyle>
+          <a:p>
+            <a:fld id="{9D531576-2D89-4077-BB9F-5DEE493AB718}" type="datetimeFigureOut">
+              <a:rPr lang="pl-PL" smtClean="0"/>
+              <a:t>06.01.2020</a:t>
+            </a:fld>
+            <a:endParaRPr lang="pl-PL"/>
+          </a:p>
+        </p:txBody>
+      </p:sp>
+      <p:sp>
+        <p:nvSpPr>
+          <p:cNvPr id="4" name="Symbol zastępczy obrazu slajdu 3"/>
+          <p:cNvSpPr>
+            <a:spLocks noGrp="1" noRot="1" noChangeAspect="1"/>
+          </p:cNvSpPr>
+          <p:nvPr>
+            <p:ph type="sldImg" idx="2"/>
+          </p:nvPr>
+        </p:nvSpPr>
+        <p:spPr>
+          <a:xfrm>
+            <a:off x="685800" y="1143000"/>
+            <a:ext cx="5486400" cy="3086100"/>
+          </a:xfrm>
+          <a:prstGeom prst="rect">
+            <a:avLst/>
+          </a:prstGeom>
+          <a:noFill/>
+          <a:ln w="12700">
+            <a:solidFill>
+              <a:prstClr val="black"/>
+            </a:solidFill>
+          </a:ln>
+        </p:spPr>
+        <p:txBody>
+          <a:bodyPr vert="horz" lIns="91440" tIns="45720" rIns="91440" bIns="45720" rtlCol="0" anchor="ctr"/>
+          <a:lstStyle/>
+          <a:p>
+            <a:endParaRPr lang="pl-PL"/>
+          </a:p>
+        </p:txBody>
+      </p:sp>
+      <p:sp>
+        <p:nvSpPr>
+          <p:cNvPr id="5" name="Symbol zastępczy notatek 4"/>
+          <p:cNvSpPr>
+            <a:spLocks noGrp="1"/>
+          </p:cNvSpPr>
+          <p:nvPr>
+            <p:ph type="body" sz="quarter" idx="3"/>
+          </p:nvPr>
+        </p:nvSpPr>
+        <p:spPr>
+          <a:xfrm>
+            <a:off x="685800" y="4400550"/>
+            <a:ext cx="5486400" cy="3600450"/>
+          </a:xfrm>
+          <a:prstGeom prst="rect">
+            <a:avLst/>
+          </a:prstGeom>
+        </p:spPr>
+        <p:txBody>
+          <a:bodyPr vert="horz" lIns="91440" tIns="45720" rIns="91440" bIns="45720" rtlCol="0"/>
+          <a:lstStyle/>
+          <a:p>
+            <a:pPr lvl="0"/>
+            <a:r>
+              <a:rPr lang="pl-PL"/>
+              <a:t>Kliknij, aby edytować style wzorca tekstu</a:t>
+            </a:r>
+          </a:p>
+          <a:p>
+            <a:pPr lvl="1"/>
+            <a:r>
+              <a:rPr lang="pl-PL"/>
+              <a:t>Drugi poziom</a:t>
+            </a:r>
+          </a:p>
+          <a:p>
+            <a:pPr lvl="2"/>
+            <a:r>
+              <a:rPr lang="pl-PL"/>
+              <a:t>Trzeci poziom</a:t>
+            </a:r>
+          </a:p>
+          <a:p>
+            <a:pPr lvl="3"/>
+            <a:r>
+              <a:rPr lang="pl-PL"/>
+              <a:t>Czwarty poziom</a:t>
+            </a:r>
+          </a:p>
+          <a:p>
+            <a:pPr lvl="4"/>
+            <a:r>
+              <a:rPr lang="pl-PL"/>
+              <a:t>Piąty poziom</a:t>
+            </a:r>
+          </a:p>
+        </p:txBody>
+      </p:sp>
+      <p:sp>
+        <p:nvSpPr>
+          <p:cNvPr id="6" name="Symbol zastępczy stopki 5"/>
+          <p:cNvSpPr>
+            <a:spLocks noGrp="1"/>
+          </p:cNvSpPr>
+          <p:nvPr>
+            <p:ph type="ftr" sz="quarter" idx="4"/>
+          </p:nvPr>
+        </p:nvSpPr>
+        <p:spPr>
+          <a:xfrm>
+            <a:off x="0" y="8685213"/>
+            <a:ext cx="2971800" cy="458787"/>
+          </a:xfrm>
+          <a:prstGeom prst="rect">
+            <a:avLst/>
+          </a:prstGeom>
+        </p:spPr>
+        <p:txBody>
+          <a:bodyPr vert="horz" lIns="91440" tIns="45720" rIns="91440" bIns="45720" rtlCol="0" anchor="b"/>
+          <a:lstStyle>
+            <a:lvl1pPr algn="l">
+              <a:defRPr sz="1200"/>
+            </a:lvl1pPr>
+          </a:lstStyle>
+          <a:p>
+            <a:endParaRPr lang="pl-PL"/>
+          </a:p>
+        </p:txBody>
+      </p:sp>
+      <p:sp>
+        <p:nvSpPr>
+          <p:cNvPr id="7" name="Symbol zastępczy numeru slajdu 6"/>
+          <p:cNvSpPr>
+            <a:spLocks noGrp="1"/>
+          </p:cNvSpPr>
+          <p:nvPr>
+            <p:ph type="sldNum" sz="quarter" idx="5"/>
+          </p:nvPr>
+        </p:nvSpPr>
+        <p:spPr>
+          <a:xfrm>
+            <a:off x="3884613" y="8685213"/>
+            <a:ext cx="2971800" cy="458787"/>
+          </a:xfrm>
+          <a:prstGeom prst="rect">
+            <a:avLst/>
+          </a:prstGeom>
+        </p:spPr>
+        <p:txBody>
+          <a:bodyPr vert="horz" lIns="91440" tIns="45720" rIns="91440" bIns="45720" rtlCol="0" anchor="b"/>
+          <a:lstStyle>
+            <a:lvl1pPr algn="r">
+              <a:defRPr sz="1200"/>
+            </a:lvl1pPr>
+          </a:lstStyle>
+          <a:p>
+            <a:fld id="{5B8DBF3F-7553-4CDB-9A1E-D7E00473ACDE}" type="slidenum">
+              <a:rPr lang="pl-PL" smtClean="0"/>
+              <a:t>‹#›</a:t>
+            </a:fld>
+            <a:endParaRPr lang="pl-PL"/>
+          </a:p>
+        </p:txBody>
+      </p:sp>
+    </p:spTree>
+    <p:extLst>
+      <p:ext uri="{BB962C8B-B14F-4D97-AF65-F5344CB8AC3E}">
+        <p14:creationId xmlns:p14="http://schemas.microsoft.com/office/powerpoint/2010/main" val="3187059352"/>
+      </p:ext>
+    </p:extLst>
+  </p:cSld>
+  <p:clrMap bg1="lt1" tx1="dk1" bg2="lt2" tx2="dk2" accent1="accent1" accent2="accent2" accent3="accent3" accent4="accent4" accent5="accent5" accent6="accent6" hlink="hlink" folHlink="folHlink"/>
+  <p:notesStyle>
+    <a:lvl1pPr marL="0" algn="l" defTabSz="914400" rtl="0" eaLnBrk="1" latinLnBrk="0" hangingPunct="1">
+      <a:defRPr sz="1200" kern="1200">
+        <a:solidFill>
+          <a:schemeClr val="tx1"/>
+        </a:solidFill>
+        <a:latin typeface="+mn-lt"/>
+        <a:ea typeface="+mn-ea"/>
+        <a:cs typeface="+mn-cs"/>
+      </a:defRPr>
+    </a:lvl1pPr>
+    <a:lvl2pPr marL="457200" algn="l" defTabSz="914400" rtl="0" eaLnBrk="1" latinLnBrk="0" hangingPunct="1">
+      <a:defRPr sz="1200" kern="1200">
+        <a:solidFill>
+          <a:schemeClr val="tx1"/>
+        </a:solidFill>
+        <a:latin typeface="+mn-lt"/>
+        <a:ea typeface="+mn-ea"/>
+        <a:cs typeface="+mn-cs"/>
+      </a:defRPr>
+    </a:lvl2pPr>
+    <a:lvl3pPr marL="914400" algn="l" defTabSz="914400" rtl="0" eaLnBrk="1" latinLnBrk="0" hangingPunct="1">
+      <a:defRPr sz="1200" kern="1200">
+        <a:solidFill>
+          <a:schemeClr val="tx1"/>
+        </a:solidFill>
+        <a:latin typeface="+mn-lt"/>
+        <a:ea typeface="+mn-ea"/>
+        <a:cs typeface="+mn-cs"/>
+      </a:defRPr>
+    </a:lvl3pPr>
+    <a:lvl4pPr marL="1371600" algn="l" defTabSz="914400" rtl="0" eaLnBrk="1" latinLnBrk="0" hangingPunct="1">
+      <a:defRPr sz="1200" kern="1200">
+        <a:solidFill>
+          <a:schemeClr val="tx1"/>
+        </a:solidFill>
+        <a:latin typeface="+mn-lt"/>
+        <a:ea typeface="+mn-ea"/>
+        <a:cs typeface="+mn-cs"/>
+      </a:defRPr>
+    </a:lvl4pPr>
+    <a:lvl5pPr marL="1828800" algn="l" defTabSz="914400" rtl="0" eaLnBrk="1" latinLnBrk="0" hangingPunct="1">
+      <a:defRPr sz="1200" kern="1200">
+        <a:solidFill>
+          <a:schemeClr val="tx1"/>
+        </a:solidFill>
+        <a:latin typeface="+mn-lt"/>
+        <a:ea typeface="+mn-ea"/>
+        <a:cs typeface="+mn-cs"/>
+      </a:defRPr>
+    </a:lvl5pPr>
+    <a:lvl6pPr marL="2286000" algn="l" defTabSz="914400" rtl="0" eaLnBrk="1" latinLnBrk="0" hangingPunct="1">
+      <a:defRPr sz="1200" kern="1200">
+        <a:solidFill>
+          <a:schemeClr val="tx1"/>
+        </a:solidFill>
+        <a:latin typeface="+mn-lt"/>
+        <a:ea typeface="+mn-ea"/>
+        <a:cs typeface="+mn-cs"/>
+      </a:defRPr>
+    </a:lvl6pPr>
+    <a:lvl7pPr marL="2743200" algn="l" defTabSz="914400" rtl="0" eaLnBrk="1" latinLnBrk="0" hangingPunct="1">
+      <a:defRPr sz="1200" kern="1200">
+        <a:solidFill>
+          <a:schemeClr val="tx1"/>
+        </a:solidFill>
+        <a:latin typeface="+mn-lt"/>
+        <a:ea typeface="+mn-ea"/>
+        <a:cs typeface="+mn-cs"/>
+      </a:defRPr>
+    </a:lvl7pPr>
+    <a:lvl8pPr marL="3200400" algn="l" defTabSz="914400" rtl="0" eaLnBrk="1" latinLnBrk="0" hangingPunct="1">
+      <a:defRPr sz="1200" kern="1200">
+        <a:solidFill>
+          <a:schemeClr val="tx1"/>
+        </a:solidFill>
+        <a:latin typeface="+mn-lt"/>
+        <a:ea typeface="+mn-ea"/>
+        <a:cs typeface="+mn-cs"/>
+      </a:defRPr>
+    </a:lvl8pPr>
+    <a:lvl9pPr marL="3657600" algn="l" defTabSz="914400" rtl="0" eaLnBrk="1" latinLnBrk="0" hangingPunct="1">
+      <a:defRPr sz="1200" kern="1200">
+        <a:solidFill>
+          <a:schemeClr val="tx1"/>
+        </a:solidFill>
+        <a:latin typeface="+mn-lt"/>
+        <a:ea typeface="+mn-ea"/>
+        <a:cs typeface="+mn-cs"/>
+      </a:defRPr>
+    </a:lvl9pPr>
+  </p:notesStyle>
+</p:notesMaster>
+</file>
+
+<file path=ppt/notesSlides/notesSlide1.xml><?xml version="1.0" encoding="utf-8"?>
+<p:notes xmlns:a="http://schemas.openxmlformats.org/drawingml/2006/main" xmlns:r="http://schemas.openxmlformats.org/officeDocument/2006/relationships" xmlns:p="http://schemas.openxmlformats.org/presentationml/2006/main">
+  <p:cSld>
+    <p:spTree>
+      <p:nvGrpSpPr>
+        <p:cNvPr id="1" name=""/>
+        <p:cNvGrpSpPr/>
+        <p:nvPr/>
+      </p:nvGrpSpPr>
+      <p:grpSpPr>
+        <a:xfrm>
+          <a:off x="0" y="0"/>
+          <a:ext cx="0" cy="0"/>
+          <a:chOff x="0" y="0"/>
+          <a:chExt cx="0" cy="0"/>
+        </a:xfrm>
+      </p:grpSpPr>
+      <p:sp>
+        <p:nvSpPr>
+          <p:cNvPr id="2" name="Symbol zastępczy obrazu slajdu 1"/>
+          <p:cNvSpPr>
+            <a:spLocks noGrp="1" noRot="1" noChangeAspect="1"/>
+          </p:cNvSpPr>
+          <p:nvPr>
+            <p:ph type="sldImg"/>
+          </p:nvPr>
+        </p:nvSpPr>
+        <p:spPr/>
+      </p:sp>
+      <p:sp>
+        <p:nvSpPr>
+          <p:cNvPr id="3" name="Symbol zastępczy notatek 2"/>
+          <p:cNvSpPr>
+            <a:spLocks noGrp="1"/>
+          </p:cNvSpPr>
+          <p:nvPr>
+            <p:ph type="body" idx="1"/>
+          </p:nvPr>
+        </p:nvSpPr>
+        <p:spPr/>
+        <p:txBody>
+          <a:bodyPr/>
+          <a:lstStyle/>
+          <a:p>
+            <a:r>
+              <a:rPr lang="pl-PL" dirty="0"/>
+              <a:t>Kliknięcie przycisku "</a:t>
+            </a:r>
+            <a:r>
+              <a:rPr lang="pl-PL" dirty="0">
+                <a:highlight>
+                  <a:srgbClr val="F36B3A"/>
+                </a:highlight>
+              </a:rPr>
+              <a:t>Run in </a:t>
+            </a:r>
+            <a:r>
+              <a:rPr lang="pl-PL" dirty="0" err="1">
+                <a:highlight>
+                  <a:srgbClr val="F36B3A"/>
+                </a:highlight>
+              </a:rPr>
+              <a:t>Postman</a:t>
+            </a:r>
+            <a:r>
+              <a:rPr lang="pl-PL" dirty="0"/>
+              <a:t>" po osadzeniu go na stronie, powoduje uruchomienie aplikacji </a:t>
+            </a:r>
+            <a:r>
+              <a:rPr lang="pl-PL" dirty="0" err="1"/>
+              <a:t>Postmana</a:t>
+            </a:r>
+            <a:r>
+              <a:rPr lang="pl-PL" dirty="0"/>
+              <a:t> i wczytanie kolekcji udostępnionej przez ten przycisk.</a:t>
+            </a:r>
+          </a:p>
+        </p:txBody>
+      </p:sp>
+      <p:sp>
+        <p:nvSpPr>
+          <p:cNvPr id="4" name="Symbol zastępczy numeru slajdu 3"/>
+          <p:cNvSpPr>
+            <a:spLocks noGrp="1"/>
+          </p:cNvSpPr>
+          <p:nvPr>
+            <p:ph type="sldNum" sz="quarter" idx="5"/>
+          </p:nvPr>
+        </p:nvSpPr>
+        <p:spPr/>
+        <p:txBody>
+          <a:bodyPr/>
+          <a:lstStyle/>
+          <a:p>
+            <a:fld id="{5B8DBF3F-7553-4CDB-9A1E-D7E00473ACDE}" type="slidenum">
+              <a:rPr lang="pl-PL" smtClean="0"/>
+              <a:t>5</a:t>
+            </a:fld>
+            <a:endParaRPr lang="pl-PL"/>
+          </a:p>
+        </p:txBody>
+      </p:sp>
+    </p:spTree>
+    <p:extLst>
+      <p:ext uri="{BB962C8B-B14F-4D97-AF65-F5344CB8AC3E}">
+        <p14:creationId xmlns:p14="http://schemas.microsoft.com/office/powerpoint/2010/main" val="79834981"/>
+      </p:ext>
+    </p:extLst>
+  </p:cSld>
+  <p:clrMapOvr>
+    <a:masterClrMapping/>
+  </p:clrMapOvr>
+</p:notes>
+</file>
+
 <file path=ppt/slideLayouts/slideLayout1.xml><?xml version="1.0" encoding="utf-8"?>
 <p:sldLayout xmlns:a="http://schemas.openxmlformats.org/drawingml/2006/main" xmlns:r="http://schemas.openxmlformats.org/officeDocument/2006/relationships" xmlns:p="http://schemas.openxmlformats.org/presentationml/2006/main" type="title" preserve="1">
   <p:cSld name="Slajd tytułowy">
@@ -286,7 +767,7 @@
           <a:p>
             <a:fld id="{673E243D-9E04-49D6-A59F-152AC17B7180}" type="datetimeFigureOut">
               <a:rPr lang="pl-PL" smtClean="0"/>
-              <a:t>02.01.2020</a:t>
+              <a:t>06.01.2020</a:t>
             </a:fld>
             <a:endParaRPr lang="pl-PL"/>
           </a:p>
@@ -484,7 +965,7 @@
           <a:p>
             <a:fld id="{673E243D-9E04-49D6-A59F-152AC17B7180}" type="datetimeFigureOut">
               <a:rPr lang="pl-PL" smtClean="0"/>
-              <a:t>02.01.2020</a:t>
+              <a:t>06.01.2020</a:t>
             </a:fld>
             <a:endParaRPr lang="pl-PL"/>
           </a:p>
@@ -692,7 +1173,7 @@
           <a:p>
             <a:fld id="{673E243D-9E04-49D6-A59F-152AC17B7180}" type="datetimeFigureOut">
               <a:rPr lang="pl-PL" smtClean="0"/>
-              <a:t>02.01.2020</a:t>
+              <a:t>06.01.2020</a:t>
             </a:fld>
             <a:endParaRPr lang="pl-PL"/>
           </a:p>
@@ -890,7 +1371,7 @@
           <a:p>
             <a:fld id="{673E243D-9E04-49D6-A59F-152AC17B7180}" type="datetimeFigureOut">
               <a:rPr lang="pl-PL" smtClean="0"/>
-              <a:t>02.01.2020</a:t>
+              <a:t>06.01.2020</a:t>
             </a:fld>
             <a:endParaRPr lang="pl-PL"/>
           </a:p>
@@ -1165,7 +1646,7 @@
           <a:p>
             <a:fld id="{673E243D-9E04-49D6-A59F-152AC17B7180}" type="datetimeFigureOut">
               <a:rPr lang="pl-PL" smtClean="0"/>
-              <a:t>02.01.2020</a:t>
+              <a:t>06.01.2020</a:t>
             </a:fld>
             <a:endParaRPr lang="pl-PL"/>
           </a:p>
@@ -1430,7 +1911,7 @@
           <a:p>
             <a:fld id="{673E243D-9E04-49D6-A59F-152AC17B7180}" type="datetimeFigureOut">
               <a:rPr lang="pl-PL" smtClean="0"/>
-              <a:t>02.01.2020</a:t>
+              <a:t>06.01.2020</a:t>
             </a:fld>
             <a:endParaRPr lang="pl-PL"/>
           </a:p>
@@ -1842,7 +2323,7 @@
           <a:p>
             <a:fld id="{673E243D-9E04-49D6-A59F-152AC17B7180}" type="datetimeFigureOut">
               <a:rPr lang="pl-PL" smtClean="0"/>
-              <a:t>02.01.2020</a:t>
+              <a:t>06.01.2020</a:t>
             </a:fld>
             <a:endParaRPr lang="pl-PL"/>
           </a:p>
@@ -1983,7 +2464,7 @@
           <a:p>
             <a:fld id="{673E243D-9E04-49D6-A59F-152AC17B7180}" type="datetimeFigureOut">
               <a:rPr lang="pl-PL" smtClean="0"/>
-              <a:t>02.01.2020</a:t>
+              <a:t>06.01.2020</a:t>
             </a:fld>
             <a:endParaRPr lang="pl-PL"/>
           </a:p>
@@ -2096,7 +2577,7 @@
           <a:p>
             <a:fld id="{673E243D-9E04-49D6-A59F-152AC17B7180}" type="datetimeFigureOut">
               <a:rPr lang="pl-PL" smtClean="0"/>
-              <a:t>02.01.2020</a:t>
+              <a:t>06.01.2020</a:t>
             </a:fld>
             <a:endParaRPr lang="pl-PL"/>
           </a:p>
@@ -2407,7 +2888,7 @@
           <a:p>
             <a:fld id="{673E243D-9E04-49D6-A59F-152AC17B7180}" type="datetimeFigureOut">
               <a:rPr lang="pl-PL" smtClean="0"/>
-              <a:t>02.01.2020</a:t>
+              <a:t>06.01.2020</a:t>
             </a:fld>
             <a:endParaRPr lang="pl-PL"/>
           </a:p>
@@ -2695,7 +3176,7 @@
           <a:p>
             <a:fld id="{673E243D-9E04-49D6-A59F-152AC17B7180}" type="datetimeFigureOut">
               <a:rPr lang="pl-PL" smtClean="0"/>
-              <a:t>02.01.2020</a:t>
+              <a:t>06.01.2020</a:t>
             </a:fld>
             <a:endParaRPr lang="pl-PL"/>
           </a:p>
@@ -2945,7 +3426,7 @@
           <a:p>
             <a:fld id="{673E243D-9E04-49D6-A59F-152AC17B7180}" type="datetimeFigureOut">
               <a:rPr lang="pl-PL" smtClean="0"/>
-              <a:t>02.01.2020</a:t>
+              <a:t>06.01.2020</a:t>
             </a:fld>
             <a:endParaRPr lang="pl-PL"/>
           </a:p>
@@ -4458,10 +4939,10 @@
       </p:sp>
       <p:sp>
         <p:nvSpPr>
-          <p:cNvPr id="3" name="pole tekstowe 2">
-            <a:extLst>
-              <a:ext uri="{FF2B5EF4-FFF2-40B4-BE49-F238E27FC236}">
-                <a16:creationId xmlns:a16="http://schemas.microsoft.com/office/drawing/2014/main" id="{0B006FCC-32C0-4919-84F5-B8782A061D57}"/>
+          <p:cNvPr id="4" name="pole tekstowe 3">
+            <a:extLst>
+              <a:ext uri="{FF2B5EF4-FFF2-40B4-BE49-F238E27FC236}">
+                <a16:creationId xmlns:a16="http://schemas.microsoft.com/office/drawing/2014/main" id="{F03D58CA-620E-4363-8705-FE4177F32A5B}"/>
               </a:ext>
             </a:extLst>
           </p:cNvPr>
@@ -4470,8 +4951,8 @@
         </p:nvSpPr>
         <p:spPr>
           <a:xfrm>
-            <a:off x="619125" y="1762125"/>
-            <a:ext cx="7800662" cy="369332"/>
+            <a:off x="352424" y="1205724"/>
+            <a:ext cx="5972176" cy="646331"/>
           </a:xfrm>
           <a:prstGeom prst="rect">
             <a:avLst/>
@@ -4479,21 +4960,423 @@
           <a:noFill/>
         </p:spPr>
         <p:txBody>
+          <a:bodyPr wrap="square" rtlCol="0">
+            <a:spAutoFit/>
+          </a:bodyPr>
+          <a:lstStyle/>
+          <a:p>
+            <a:r>
+              <a:rPr lang="pl-PL" sz="3600" dirty="0">
+                <a:solidFill>
+                  <a:srgbClr val="F8F8F8"/>
+                </a:solidFill>
+                <a:latin typeface="Roboto Medium" panose="02000000000000000000" pitchFamily="2" charset="0"/>
+                <a:ea typeface="Roboto Medium" panose="02000000000000000000" pitchFamily="2" charset="0"/>
+              </a:rPr>
+              <a:t>Po co tworzyć kolekcje?</a:t>
+            </a:r>
+          </a:p>
+        </p:txBody>
+      </p:sp>
+      <p:pic>
+        <p:nvPicPr>
+          <p:cNvPr id="5" name="Obraz 4">
+            <a:extLst>
+              <a:ext uri="{FF2B5EF4-FFF2-40B4-BE49-F238E27FC236}">
+                <a16:creationId xmlns:a16="http://schemas.microsoft.com/office/drawing/2014/main" id="{9769FF45-5195-4F87-8E75-3B2A82A62F56}"/>
+              </a:ext>
+            </a:extLst>
+          </p:cNvPr>
+          <p:cNvPicPr>
+            <a:picLocks noChangeAspect="1"/>
+          </p:cNvPicPr>
+          <p:nvPr/>
+        </p:nvPicPr>
+        <p:blipFill>
+          <a:blip r:embed="rId3">
+            <a:extLst>
+              <a:ext uri="{28A0092B-C50C-407E-A947-70E740481C1C}">
+                <a14:useLocalDpi xmlns:a14="http://schemas.microsoft.com/office/drawing/2010/main" val="0"/>
+              </a:ext>
+            </a:extLst>
+          </a:blip>
+          <a:stretch>
+            <a:fillRect/>
+          </a:stretch>
+        </p:blipFill>
+        <p:spPr>
+          <a:xfrm>
+            <a:off x="371474" y="2453784"/>
+            <a:ext cx="272061" cy="266828"/>
+          </a:xfrm>
+          <a:prstGeom prst="rect">
+            <a:avLst/>
+          </a:prstGeom>
+        </p:spPr>
+      </p:pic>
+      <p:pic>
+        <p:nvPicPr>
+          <p:cNvPr id="6" name="Obraz 5">
+            <a:extLst>
+              <a:ext uri="{FF2B5EF4-FFF2-40B4-BE49-F238E27FC236}">
+                <a16:creationId xmlns:a16="http://schemas.microsoft.com/office/drawing/2014/main" id="{E3E624B8-4B6A-495D-979A-F1B0E9AE3611}"/>
+              </a:ext>
+            </a:extLst>
+          </p:cNvPr>
+          <p:cNvPicPr>
+            <a:picLocks noChangeAspect="1"/>
+          </p:cNvPicPr>
+          <p:nvPr/>
+        </p:nvPicPr>
+        <p:blipFill>
+          <a:blip r:embed="rId4">
+            <a:extLst>
+              <a:ext uri="{28A0092B-C50C-407E-A947-70E740481C1C}">
+                <a14:useLocalDpi xmlns:a14="http://schemas.microsoft.com/office/drawing/2010/main" val="0"/>
+              </a:ext>
+            </a:extLst>
+          </a:blip>
+          <a:stretch>
+            <a:fillRect/>
+          </a:stretch>
+        </p:blipFill>
+        <p:spPr>
+          <a:xfrm>
+            <a:off x="339089" y="3610893"/>
+            <a:ext cx="303277" cy="303277"/>
+          </a:xfrm>
+          <a:prstGeom prst="rect">
+            <a:avLst/>
+          </a:prstGeom>
+        </p:spPr>
+      </p:pic>
+      <p:pic>
+        <p:nvPicPr>
+          <p:cNvPr id="7" name="Obraz 6">
+            <a:extLst>
+              <a:ext uri="{FF2B5EF4-FFF2-40B4-BE49-F238E27FC236}">
+                <a16:creationId xmlns:a16="http://schemas.microsoft.com/office/drawing/2014/main" id="{181F9D60-5028-416B-91A9-8981ACE6F010}"/>
+              </a:ext>
+            </a:extLst>
+          </p:cNvPr>
+          <p:cNvPicPr>
+            <a:picLocks noChangeAspect="1"/>
+          </p:cNvPicPr>
+          <p:nvPr/>
+        </p:nvPicPr>
+        <p:blipFill>
+          <a:blip r:embed="rId5">
+            <a:extLst>
+              <a:ext uri="{28A0092B-C50C-407E-A947-70E740481C1C}">
+                <a14:useLocalDpi xmlns:a14="http://schemas.microsoft.com/office/drawing/2010/main" val="0"/>
+              </a:ext>
+            </a:extLst>
+          </a:blip>
+          <a:stretch>
+            <a:fillRect/>
+          </a:stretch>
+        </p:blipFill>
+        <p:spPr>
+          <a:xfrm>
+            <a:off x="352424" y="4522254"/>
+            <a:ext cx="289942" cy="285858"/>
+          </a:xfrm>
+          <a:prstGeom prst="rect">
+            <a:avLst/>
+          </a:prstGeom>
+        </p:spPr>
+      </p:pic>
+      <p:sp>
+        <p:nvSpPr>
+          <p:cNvPr id="8" name="pole tekstowe 7">
+            <a:extLst>
+              <a:ext uri="{FF2B5EF4-FFF2-40B4-BE49-F238E27FC236}">
+                <a16:creationId xmlns:a16="http://schemas.microsoft.com/office/drawing/2014/main" id="{8353D9DF-736B-4389-801B-6C53B4C62C61}"/>
+              </a:ext>
+            </a:extLst>
+          </p:cNvPr>
+          <p:cNvSpPr txBox="1"/>
+          <p:nvPr/>
+        </p:nvSpPr>
+        <p:spPr>
+          <a:xfrm>
+            <a:off x="899532" y="1987034"/>
+            <a:ext cx="4948818" cy="1200329"/>
+          </a:xfrm>
+          <a:prstGeom prst="rect">
+            <a:avLst/>
+          </a:prstGeom>
+          <a:noFill/>
+        </p:spPr>
+        <p:txBody>
+          <a:bodyPr wrap="square" rtlCol="0">
+            <a:spAutoFit/>
+          </a:bodyPr>
+          <a:lstStyle/>
+          <a:p>
+            <a:pPr algn="just"/>
+            <a:r>
+              <a:rPr lang="pl-PL" dirty="0">
+                <a:solidFill>
+                  <a:srgbClr val="F8F8F8"/>
+                </a:solidFill>
+                <a:latin typeface="Roboto Medium" panose="02000000000000000000" pitchFamily="2" charset="0"/>
+                <a:ea typeface="Roboto Medium" panose="02000000000000000000" pitchFamily="2" charset="0"/>
+              </a:rPr>
+              <a:t>Kolekcje pozwalają organizować żądania w grupy i podgrupy przy pomocy folderów. Zapobiega to konieczności przeszukiwania często używanych żądań w historii.</a:t>
+            </a:r>
+          </a:p>
+        </p:txBody>
+      </p:sp>
+      <p:sp>
+        <p:nvSpPr>
+          <p:cNvPr id="9" name="pole tekstowe 8">
+            <a:extLst>
+              <a:ext uri="{FF2B5EF4-FFF2-40B4-BE49-F238E27FC236}">
+                <a16:creationId xmlns:a16="http://schemas.microsoft.com/office/drawing/2014/main" id="{10F7424C-148E-4E98-95F6-8C7256F39CF4}"/>
+              </a:ext>
+            </a:extLst>
+          </p:cNvPr>
+          <p:cNvSpPr txBox="1"/>
+          <p:nvPr/>
+        </p:nvSpPr>
+        <p:spPr>
+          <a:xfrm>
+            <a:off x="899531" y="3281400"/>
+            <a:ext cx="5309467" cy="923330"/>
+          </a:xfrm>
+          <a:prstGeom prst="rect">
+            <a:avLst/>
+          </a:prstGeom>
+          <a:noFill/>
+        </p:spPr>
+        <p:txBody>
           <a:bodyPr wrap="none" rtlCol="0">
             <a:spAutoFit/>
           </a:bodyPr>
           <a:lstStyle/>
           <a:p>
+            <a:pPr algn="just"/>
             <a:r>
               <a:rPr lang="pl-PL" dirty="0">
-                <a:hlinkClick r:id="rId3"/>
+                <a:solidFill>
+                  <a:srgbClr val="F8F8F8"/>
+                </a:solidFill>
+                <a:latin typeface="Roboto Medium" panose="02000000000000000000" pitchFamily="2" charset="0"/>
+                <a:ea typeface="Roboto Medium" panose="02000000000000000000" pitchFamily="2" charset="0"/>
               </a:rPr>
-              <a:t>https://learning.getpostman.com/docs/postman/collections/intro-to-collections/</a:t>
-            </a:r>
-            <a:endParaRPr lang="pl-PL" dirty="0"/>
-          </a:p>
-        </p:txBody>
-      </p:sp>
+              <a:t>Dodawanie opisów do żądań, folderów i kolekcji</a:t>
+            </a:r>
+            <a:br>
+              <a:rPr lang="pl-PL" dirty="0">
+                <a:solidFill>
+                  <a:srgbClr val="F8F8F8"/>
+                </a:solidFill>
+                <a:latin typeface="Roboto Medium" panose="02000000000000000000" pitchFamily="2" charset="0"/>
+                <a:ea typeface="Roboto Medium" panose="02000000000000000000" pitchFamily="2" charset="0"/>
+              </a:rPr>
+            </a:br>
+            <a:r>
+              <a:rPr lang="pl-PL" dirty="0">
+                <a:solidFill>
+                  <a:srgbClr val="F8F8F8"/>
+                </a:solidFill>
+                <a:latin typeface="Roboto Medium" panose="02000000000000000000" pitchFamily="2" charset="0"/>
+                <a:ea typeface="Roboto Medium" panose="02000000000000000000" pitchFamily="2" charset="0"/>
+              </a:rPr>
+              <a:t>pozwala na stworzenie przejrzystej dokumentacji </a:t>
+            </a:r>
+            <a:br>
+              <a:rPr lang="pl-PL" dirty="0">
+                <a:solidFill>
+                  <a:srgbClr val="F8F8F8"/>
+                </a:solidFill>
+                <a:latin typeface="Roboto Medium" panose="02000000000000000000" pitchFamily="2" charset="0"/>
+                <a:ea typeface="Roboto Medium" panose="02000000000000000000" pitchFamily="2" charset="0"/>
+              </a:rPr>
+            </a:br>
+            <a:r>
+              <a:rPr lang="pl-PL" dirty="0">
+                <a:solidFill>
+                  <a:srgbClr val="F8F8F8"/>
+                </a:solidFill>
+                <a:latin typeface="Roboto Medium" panose="02000000000000000000" pitchFamily="2" charset="0"/>
+                <a:ea typeface="Roboto Medium" panose="02000000000000000000" pitchFamily="2" charset="0"/>
+              </a:rPr>
+              <a:t>naszego API na podstawie zawartości kolekcji.</a:t>
+            </a:r>
+          </a:p>
+        </p:txBody>
+      </p:sp>
+      <p:sp>
+        <p:nvSpPr>
+          <p:cNvPr id="10" name="pole tekstowe 9">
+            <a:extLst>
+              <a:ext uri="{FF2B5EF4-FFF2-40B4-BE49-F238E27FC236}">
+                <a16:creationId xmlns:a16="http://schemas.microsoft.com/office/drawing/2014/main" id="{A0226ED7-78AD-4894-96F9-CCADA9C7B89E}"/>
+              </a:ext>
+            </a:extLst>
+          </p:cNvPr>
+          <p:cNvSpPr txBox="1"/>
+          <p:nvPr/>
+        </p:nvSpPr>
+        <p:spPr>
+          <a:xfrm>
+            <a:off x="899531" y="4203518"/>
+            <a:ext cx="5196469" cy="923330"/>
+          </a:xfrm>
+          <a:prstGeom prst="rect">
+            <a:avLst/>
+          </a:prstGeom>
+          <a:noFill/>
+        </p:spPr>
+        <p:txBody>
+          <a:bodyPr wrap="square" rtlCol="0">
+            <a:spAutoFit/>
+          </a:bodyPr>
+          <a:lstStyle/>
+          <a:p>
+            <a:r>
+              <a:rPr lang="pl-PL" dirty="0">
+                <a:solidFill>
+                  <a:srgbClr val="F8F8F8"/>
+                </a:solidFill>
+                <a:latin typeface="Roboto Medium" panose="02000000000000000000" pitchFamily="2" charset="0"/>
+                <a:ea typeface="Roboto Medium" panose="02000000000000000000" pitchFamily="2" charset="0"/>
+              </a:rPr>
+              <a:t>Zgrupowane żądania mogą zostać </a:t>
+            </a:r>
+            <a:r>
+              <a:rPr lang="pl-PL" dirty="0" err="1">
+                <a:solidFill>
+                  <a:srgbClr val="F8F8F8"/>
+                </a:solidFill>
+                <a:latin typeface="Roboto Medium" panose="02000000000000000000" pitchFamily="2" charset="0"/>
+                <a:ea typeface="Roboto Medium" panose="02000000000000000000" pitchFamily="2" charset="0"/>
+              </a:rPr>
+              <a:t>oskryptowane</a:t>
+            </a:r>
+            <a:r>
+              <a:rPr lang="pl-PL" dirty="0">
+                <a:solidFill>
+                  <a:srgbClr val="F8F8F8"/>
+                </a:solidFill>
+                <a:latin typeface="Roboto Medium" panose="02000000000000000000" pitchFamily="2" charset="0"/>
+                <a:ea typeface="Roboto Medium" panose="02000000000000000000" pitchFamily="2" charset="0"/>
+              </a:rPr>
+              <a:t> i uruchomione sekwencyjnie w celu przeprowadzenia  testów automatycznych API.</a:t>
+            </a:r>
+          </a:p>
+        </p:txBody>
+      </p:sp>
+      <p:pic>
+        <p:nvPicPr>
+          <p:cNvPr id="11" name="Obraz 10">
+            <a:extLst>
+              <a:ext uri="{FF2B5EF4-FFF2-40B4-BE49-F238E27FC236}">
+                <a16:creationId xmlns:a16="http://schemas.microsoft.com/office/drawing/2014/main" id="{B9D24F1D-D2F5-44FD-8D5D-0E3E7CA17188}"/>
+              </a:ext>
+            </a:extLst>
+          </p:cNvPr>
+          <p:cNvPicPr>
+            <a:picLocks noChangeAspect="1"/>
+          </p:cNvPicPr>
+          <p:nvPr/>
+        </p:nvPicPr>
+        <p:blipFill>
+          <a:blip r:embed="rId6">
+            <a:extLst>
+              <a:ext uri="{28A0092B-C50C-407E-A947-70E740481C1C}">
+                <a14:useLocalDpi xmlns:a14="http://schemas.microsoft.com/office/drawing/2010/main" val="0"/>
+              </a:ext>
+            </a:extLst>
+          </a:blip>
+          <a:stretch>
+            <a:fillRect/>
+          </a:stretch>
+        </p:blipFill>
+        <p:spPr>
+          <a:xfrm>
+            <a:off x="352424" y="5625383"/>
+            <a:ext cx="292609" cy="292609"/>
+          </a:xfrm>
+          <a:prstGeom prst="rect">
+            <a:avLst/>
+          </a:prstGeom>
+        </p:spPr>
+      </p:pic>
+      <p:sp>
+        <p:nvSpPr>
+          <p:cNvPr id="12" name="pole tekstowe 11">
+            <a:extLst>
+              <a:ext uri="{FF2B5EF4-FFF2-40B4-BE49-F238E27FC236}">
+                <a16:creationId xmlns:a16="http://schemas.microsoft.com/office/drawing/2014/main" id="{02820D67-DA86-42C3-9D8A-D3065C47280F}"/>
+              </a:ext>
+            </a:extLst>
+          </p:cNvPr>
+          <p:cNvSpPr txBox="1"/>
+          <p:nvPr/>
+        </p:nvSpPr>
+        <p:spPr>
+          <a:xfrm>
+            <a:off x="899531" y="5171524"/>
+            <a:ext cx="5196469" cy="1200329"/>
+          </a:xfrm>
+          <a:prstGeom prst="rect">
+            <a:avLst/>
+          </a:prstGeom>
+          <a:noFill/>
+        </p:spPr>
+        <p:txBody>
+          <a:bodyPr wrap="square" rtlCol="0">
+            <a:spAutoFit/>
+          </a:bodyPr>
+          <a:lstStyle/>
+          <a:p>
+            <a:pPr algn="just"/>
+            <a:r>
+              <a:rPr lang="pl-PL" dirty="0">
+                <a:solidFill>
+                  <a:srgbClr val="F8F8F8"/>
+                </a:solidFill>
+                <a:latin typeface="Roboto Medium" panose="02000000000000000000" pitchFamily="2" charset="0"/>
+                <a:ea typeface="Roboto Medium" panose="02000000000000000000" pitchFamily="2" charset="0"/>
+              </a:rPr>
+              <a:t>Dzięki skryptom dane mogą być przekazywane pomiędzy żądaniami z danej kolekcji, co pozwala na budowanie sekwencji żądań zgodnej z rzeczywistym wykorzystaniem API.</a:t>
+            </a:r>
+          </a:p>
+        </p:txBody>
+      </p:sp>
+      <p:pic>
+        <p:nvPicPr>
+          <p:cNvPr id="14" name="Obraz 13">
+            <a:extLst>
+              <a:ext uri="{FF2B5EF4-FFF2-40B4-BE49-F238E27FC236}">
+                <a16:creationId xmlns:a16="http://schemas.microsoft.com/office/drawing/2014/main" id="{46E9685B-5C8E-4286-A49D-675FF4859D86}"/>
+              </a:ext>
+            </a:extLst>
+          </p:cNvPr>
+          <p:cNvPicPr>
+            <a:picLocks noChangeAspect="1"/>
+          </p:cNvPicPr>
+          <p:nvPr/>
+        </p:nvPicPr>
+        <p:blipFill>
+          <a:blip r:embed="rId7"/>
+          <a:stretch>
+            <a:fillRect/>
+          </a:stretch>
+        </p:blipFill>
+        <p:spPr>
+          <a:xfrm>
+            <a:off x="7045326" y="1205724"/>
+            <a:ext cx="5068945" cy="5166129"/>
+          </a:xfrm>
+          <a:prstGeom prst="rect">
+            <a:avLst/>
+          </a:prstGeom>
+        </p:spPr>
+      </p:pic>
     </p:spTree>
     <p:extLst>
       <p:ext uri="{BB962C8B-B14F-4D97-AF65-F5344CB8AC3E}">
@@ -4508,6 +5391,938 @@
 </file>
 
 <file path=ppt/slides/slide4.xml><?xml version="1.0" encoding="utf-8"?>
+<p:sld xmlns:a="http://schemas.openxmlformats.org/drawingml/2006/main" xmlns:r="http://schemas.openxmlformats.org/officeDocument/2006/relationships" xmlns:p="http://schemas.openxmlformats.org/presentationml/2006/main">
+  <p:cSld>
+    <p:bg>
+      <p:bgPr>
+        <a:blipFill dpi="0" rotWithShape="1">
+          <a:blip r:embed="rId2">
+            <a:lum/>
+          </a:blip>
+          <a:srcRect/>
+          <a:stretch>
+            <a:fillRect/>
+          </a:stretch>
+        </a:blipFill>
+        <a:effectLst/>
+      </p:bgPr>
+    </p:bg>
+    <p:spTree>
+      <p:nvGrpSpPr>
+        <p:cNvPr id="1" name=""/>
+        <p:cNvGrpSpPr/>
+        <p:nvPr/>
+      </p:nvGrpSpPr>
+      <p:grpSpPr>
+        <a:xfrm>
+          <a:off x="0" y="0"/>
+          <a:ext cx="0" cy="0"/>
+          <a:chOff x="0" y="0"/>
+          <a:chExt cx="0" cy="0"/>
+        </a:xfrm>
+      </p:grpSpPr>
+      <p:sp>
+        <p:nvSpPr>
+          <p:cNvPr id="2" name="pole tekstowe 1">
+            <a:extLst>
+              <a:ext uri="{FF2B5EF4-FFF2-40B4-BE49-F238E27FC236}">
+                <a16:creationId xmlns:a16="http://schemas.microsoft.com/office/drawing/2014/main" id="{93F3B43B-190C-4F5E-99E0-D00D0FA5B8EF}"/>
+              </a:ext>
+            </a:extLst>
+          </p:cNvPr>
+          <p:cNvSpPr txBox="1"/>
+          <p:nvPr/>
+        </p:nvSpPr>
+        <p:spPr>
+          <a:xfrm>
+            <a:off x="990600" y="304800"/>
+            <a:ext cx="3762375" cy="461665"/>
+          </a:xfrm>
+          <a:prstGeom prst="rect">
+            <a:avLst/>
+          </a:prstGeom>
+          <a:noFill/>
+        </p:spPr>
+        <p:txBody>
+          <a:bodyPr wrap="square" rtlCol="0">
+            <a:spAutoFit/>
+          </a:bodyPr>
+          <a:lstStyle/>
+          <a:p>
+            <a:r>
+              <a:rPr lang="pl-PL" sz="2400" dirty="0">
+                <a:solidFill>
+                  <a:srgbClr val="F36B3A"/>
+                </a:solidFill>
+                <a:latin typeface="Roboto Light" panose="02000000000000000000" pitchFamily="2" charset="0"/>
+                <a:ea typeface="Roboto Light" panose="02000000000000000000" pitchFamily="2" charset="0"/>
+              </a:rPr>
+              <a:t>PRZESTRZENIE ROBOCZE</a:t>
+            </a:r>
+          </a:p>
+        </p:txBody>
+      </p:sp>
+      <p:sp>
+        <p:nvSpPr>
+          <p:cNvPr id="4" name="pole tekstowe 3">
+            <a:extLst>
+              <a:ext uri="{FF2B5EF4-FFF2-40B4-BE49-F238E27FC236}">
+                <a16:creationId xmlns:a16="http://schemas.microsoft.com/office/drawing/2014/main" id="{F03D58CA-620E-4363-8705-FE4177F32A5B}"/>
+              </a:ext>
+            </a:extLst>
+          </p:cNvPr>
+          <p:cNvSpPr txBox="1"/>
+          <p:nvPr/>
+        </p:nvSpPr>
+        <p:spPr>
+          <a:xfrm>
+            <a:off x="123824" y="2905809"/>
+            <a:ext cx="6981826" cy="646331"/>
+          </a:xfrm>
+          <a:prstGeom prst="rect">
+            <a:avLst/>
+          </a:prstGeom>
+          <a:noFill/>
+        </p:spPr>
+        <p:txBody>
+          <a:bodyPr wrap="square" rtlCol="0">
+            <a:spAutoFit/>
+          </a:bodyPr>
+          <a:lstStyle/>
+          <a:p>
+            <a:r>
+              <a:rPr lang="pl-PL" sz="3600" dirty="0">
+                <a:solidFill>
+                  <a:srgbClr val="F8F8F8"/>
+                </a:solidFill>
+                <a:latin typeface="Roboto Medium" panose="02000000000000000000" pitchFamily="2" charset="0"/>
+                <a:ea typeface="Roboto Medium" panose="02000000000000000000" pitchFamily="2" charset="0"/>
+              </a:rPr>
+              <a:t>Rodzaje przestrzeni roboczych</a:t>
+            </a:r>
+          </a:p>
+        </p:txBody>
+      </p:sp>
+      <p:sp>
+        <p:nvSpPr>
+          <p:cNvPr id="8" name="pole tekstowe 7">
+            <a:extLst>
+              <a:ext uri="{FF2B5EF4-FFF2-40B4-BE49-F238E27FC236}">
+                <a16:creationId xmlns:a16="http://schemas.microsoft.com/office/drawing/2014/main" id="{8353D9DF-736B-4389-801B-6C53B4C62C61}"/>
+              </a:ext>
+            </a:extLst>
+          </p:cNvPr>
+          <p:cNvSpPr txBox="1"/>
+          <p:nvPr/>
+        </p:nvSpPr>
+        <p:spPr>
+          <a:xfrm>
+            <a:off x="123824" y="1860716"/>
+            <a:ext cx="11501438" cy="923330"/>
+          </a:xfrm>
+          <a:prstGeom prst="rect">
+            <a:avLst/>
+          </a:prstGeom>
+          <a:noFill/>
+        </p:spPr>
+        <p:txBody>
+          <a:bodyPr wrap="square" rtlCol="0">
+            <a:spAutoFit/>
+          </a:bodyPr>
+          <a:lstStyle/>
+          <a:p>
+            <a:pPr algn="just"/>
+            <a:r>
+              <a:rPr lang="pl-PL" dirty="0">
+                <a:solidFill>
+                  <a:srgbClr val="F8F8F8"/>
+                </a:solidFill>
+                <a:latin typeface="Roboto Medium" panose="02000000000000000000" pitchFamily="2" charset="0"/>
+                <a:ea typeface="Roboto Medium" panose="02000000000000000000" pitchFamily="2" charset="0"/>
+              </a:rPr>
+              <a:t>Przestrzeń robocza w </a:t>
+            </a:r>
+            <a:r>
+              <a:rPr lang="pl-PL" dirty="0" err="1">
+                <a:solidFill>
+                  <a:srgbClr val="F8F8F8"/>
+                </a:solidFill>
+                <a:latin typeface="Roboto Medium" panose="02000000000000000000" pitchFamily="2" charset="0"/>
+                <a:ea typeface="Roboto Medium" panose="02000000000000000000" pitchFamily="2" charset="0"/>
+              </a:rPr>
+              <a:t>Postmanie</a:t>
+            </a:r>
+            <a:r>
+              <a:rPr lang="pl-PL" dirty="0">
+                <a:solidFill>
+                  <a:srgbClr val="F8F8F8"/>
+                </a:solidFill>
+                <a:latin typeface="Roboto Medium" panose="02000000000000000000" pitchFamily="2" charset="0"/>
+                <a:ea typeface="Roboto Medium" panose="02000000000000000000" pitchFamily="2" charset="0"/>
+              </a:rPr>
+              <a:t> grupuje w jeden widok takie elementy jak kolekcje, środowiska, moki i monitoringi. Będąc zalogowanym na swoje konto </a:t>
+            </a:r>
+            <a:r>
+              <a:rPr lang="pl-PL" dirty="0" err="1">
+                <a:solidFill>
+                  <a:srgbClr val="F8F8F8"/>
+                </a:solidFill>
+                <a:latin typeface="Roboto Medium" panose="02000000000000000000" pitchFamily="2" charset="0"/>
+                <a:ea typeface="Roboto Medium" panose="02000000000000000000" pitchFamily="2" charset="0"/>
+              </a:rPr>
+              <a:t>postmanowe</a:t>
+            </a:r>
+            <a:r>
+              <a:rPr lang="pl-PL" dirty="0">
+                <a:solidFill>
+                  <a:srgbClr val="F8F8F8"/>
+                </a:solidFill>
+                <a:latin typeface="Roboto Medium" panose="02000000000000000000" pitchFamily="2" charset="0"/>
+                <a:ea typeface="Roboto Medium" panose="02000000000000000000" pitchFamily="2" charset="0"/>
+              </a:rPr>
+              <a:t> możemy tworzyć niezależne przestrzenie, co pozwala nam całkowicie odseparować wszystkie elementy wykorzystywane w </a:t>
+            </a:r>
+            <a:r>
+              <a:rPr lang="pl-PL" dirty="0" err="1">
+                <a:solidFill>
+                  <a:srgbClr val="F8F8F8"/>
+                </a:solidFill>
+                <a:latin typeface="Roboto Medium" panose="02000000000000000000" pitchFamily="2" charset="0"/>
+                <a:ea typeface="Roboto Medium" panose="02000000000000000000" pitchFamily="2" charset="0"/>
+              </a:rPr>
+              <a:t>postmanie</a:t>
+            </a:r>
+            <a:r>
+              <a:rPr lang="pl-PL" dirty="0">
+                <a:solidFill>
+                  <a:srgbClr val="F8F8F8"/>
+                </a:solidFill>
+                <a:latin typeface="Roboto Medium" panose="02000000000000000000" pitchFamily="2" charset="0"/>
+                <a:ea typeface="Roboto Medium" panose="02000000000000000000" pitchFamily="2" charset="0"/>
+              </a:rPr>
+              <a:t> dla danego projektu.</a:t>
+            </a:r>
+          </a:p>
+        </p:txBody>
+      </p:sp>
+      <p:sp>
+        <p:nvSpPr>
+          <p:cNvPr id="13" name="pole tekstowe 12">
+            <a:extLst>
+              <a:ext uri="{FF2B5EF4-FFF2-40B4-BE49-F238E27FC236}">
+                <a16:creationId xmlns:a16="http://schemas.microsoft.com/office/drawing/2014/main" id="{0A1994D5-2E49-4A08-BBFF-AB6BF34D2683}"/>
+              </a:ext>
+            </a:extLst>
+          </p:cNvPr>
+          <p:cNvSpPr txBox="1"/>
+          <p:nvPr/>
+        </p:nvSpPr>
+        <p:spPr>
+          <a:xfrm>
+            <a:off x="123824" y="1214817"/>
+            <a:ext cx="7229476" cy="646331"/>
+          </a:xfrm>
+          <a:prstGeom prst="rect">
+            <a:avLst/>
+          </a:prstGeom>
+          <a:noFill/>
+        </p:spPr>
+        <p:txBody>
+          <a:bodyPr wrap="square" rtlCol="0">
+            <a:spAutoFit/>
+          </a:bodyPr>
+          <a:lstStyle/>
+          <a:p>
+            <a:r>
+              <a:rPr lang="pl-PL" sz="3600" dirty="0">
+                <a:solidFill>
+                  <a:srgbClr val="F8F8F8"/>
+                </a:solidFill>
+                <a:latin typeface="Roboto Medium" panose="02000000000000000000" pitchFamily="2" charset="0"/>
+                <a:ea typeface="Roboto Medium" panose="02000000000000000000" pitchFamily="2" charset="0"/>
+              </a:rPr>
+              <a:t>Co to jest przestrzeń robocza?</a:t>
+            </a:r>
+          </a:p>
+        </p:txBody>
+      </p:sp>
+      <p:sp>
+        <p:nvSpPr>
+          <p:cNvPr id="3" name="Prostokąt 2">
+            <a:extLst>
+              <a:ext uri="{FF2B5EF4-FFF2-40B4-BE49-F238E27FC236}">
+                <a16:creationId xmlns:a16="http://schemas.microsoft.com/office/drawing/2014/main" id="{B0B78126-26CC-4008-A438-39AE51374055}"/>
+              </a:ext>
+            </a:extLst>
+          </p:cNvPr>
+          <p:cNvSpPr/>
+          <p:nvPr/>
+        </p:nvSpPr>
+        <p:spPr>
+          <a:xfrm>
+            <a:off x="123824" y="3673903"/>
+            <a:ext cx="4095751" cy="646331"/>
+          </a:xfrm>
+          <a:prstGeom prst="rect">
+            <a:avLst/>
+          </a:prstGeom>
+        </p:spPr>
+        <p:txBody>
+          <a:bodyPr wrap="square">
+            <a:spAutoFit/>
+          </a:bodyPr>
+          <a:lstStyle/>
+          <a:p>
+            <a:pPr marL="285750" indent="-285750">
+              <a:buBlip>
+                <a:blip r:embed="rId3"/>
+              </a:buBlip>
+            </a:pPr>
+            <a:r>
+              <a:rPr lang="pl-PL" dirty="0">
+                <a:solidFill>
+                  <a:srgbClr val="F8F8F8"/>
+                </a:solidFill>
+                <a:latin typeface="Roboto Medium" panose="02000000000000000000" pitchFamily="2" charset="0"/>
+                <a:ea typeface="Roboto Medium" panose="02000000000000000000" pitchFamily="2" charset="0"/>
+              </a:rPr>
+              <a:t>Osobista</a:t>
+            </a:r>
+          </a:p>
+          <a:p>
+            <a:pPr marL="285750" indent="-285750">
+              <a:buBlip>
+                <a:blip r:embed="rId3"/>
+              </a:buBlip>
+            </a:pPr>
+            <a:r>
+              <a:rPr lang="pl-PL" dirty="0">
+                <a:solidFill>
+                  <a:srgbClr val="F8F8F8"/>
+                </a:solidFill>
+                <a:latin typeface="Roboto Medium" panose="02000000000000000000" pitchFamily="2" charset="0"/>
+                <a:ea typeface="Roboto Medium" panose="02000000000000000000" pitchFamily="2" charset="0"/>
+              </a:rPr>
+              <a:t>Zespołowa (zasadniczo płatna)</a:t>
+            </a:r>
+          </a:p>
+        </p:txBody>
+      </p:sp>
+      <p:sp>
+        <p:nvSpPr>
+          <p:cNvPr id="16" name="pole tekstowe 15">
+            <a:extLst>
+              <a:ext uri="{FF2B5EF4-FFF2-40B4-BE49-F238E27FC236}">
+                <a16:creationId xmlns:a16="http://schemas.microsoft.com/office/drawing/2014/main" id="{3A5EE7D4-F5C9-4967-AFBB-3F28514859A8}"/>
+              </a:ext>
+            </a:extLst>
+          </p:cNvPr>
+          <p:cNvSpPr txBox="1"/>
+          <p:nvPr/>
+        </p:nvSpPr>
+        <p:spPr>
+          <a:xfrm>
+            <a:off x="123824" y="4441997"/>
+            <a:ext cx="11501438" cy="646331"/>
+          </a:xfrm>
+          <a:prstGeom prst="rect">
+            <a:avLst/>
+          </a:prstGeom>
+          <a:noFill/>
+        </p:spPr>
+        <p:txBody>
+          <a:bodyPr wrap="square" rtlCol="0">
+            <a:spAutoFit/>
+          </a:bodyPr>
+          <a:lstStyle/>
+          <a:p>
+            <a:pPr algn="just"/>
+            <a:r>
+              <a:rPr lang="pl-PL" dirty="0">
+                <a:solidFill>
+                  <a:srgbClr val="F8F8F8"/>
+                </a:solidFill>
+                <a:latin typeface="Roboto Medium" panose="02000000000000000000" pitchFamily="2" charset="0"/>
+                <a:ea typeface="Roboto Medium" panose="02000000000000000000" pitchFamily="2" charset="0"/>
+              </a:rPr>
+              <a:t>Osobista przestrzeń robocza jest w pełni darmowa i funkcjonalna. Nie ma ograniczeń ilości tworzonych przestrzeni, ani elementów, które przestrzeń może zawierać.</a:t>
+            </a:r>
+          </a:p>
+        </p:txBody>
+      </p:sp>
+      <p:sp>
+        <p:nvSpPr>
+          <p:cNvPr id="17" name="pole tekstowe 16">
+            <a:extLst>
+              <a:ext uri="{FF2B5EF4-FFF2-40B4-BE49-F238E27FC236}">
+                <a16:creationId xmlns:a16="http://schemas.microsoft.com/office/drawing/2014/main" id="{9E1F279A-C7EF-41A2-ABE4-C5103C67A4D6}"/>
+              </a:ext>
+            </a:extLst>
+          </p:cNvPr>
+          <p:cNvSpPr txBox="1"/>
+          <p:nvPr/>
+        </p:nvSpPr>
+        <p:spPr>
+          <a:xfrm>
+            <a:off x="123824" y="5210091"/>
+            <a:ext cx="11501438" cy="923330"/>
+          </a:xfrm>
+          <a:prstGeom prst="rect">
+            <a:avLst/>
+          </a:prstGeom>
+          <a:noFill/>
+        </p:spPr>
+        <p:txBody>
+          <a:bodyPr wrap="square" rtlCol="0">
+            <a:spAutoFit/>
+          </a:bodyPr>
+          <a:lstStyle/>
+          <a:p>
+            <a:pPr algn="just"/>
+            <a:r>
+              <a:rPr lang="pl-PL" dirty="0">
+                <a:solidFill>
+                  <a:srgbClr val="F8F8F8"/>
+                </a:solidFill>
+                <a:latin typeface="Roboto Medium" panose="02000000000000000000" pitchFamily="2" charset="0"/>
+                <a:ea typeface="Roboto Medium" panose="02000000000000000000" pitchFamily="2" charset="0"/>
+              </a:rPr>
+              <a:t>Zespołowa przestrzeń robocza pozwala dodatkowo na współdzielenie kolekcji pomiędzy różnych użytkowników. Wszelkie zmiany dokonywane w takiej współdzielonej kolekcji są automatycznie synchronizowane.</a:t>
+            </a:r>
+          </a:p>
+        </p:txBody>
+      </p:sp>
+    </p:spTree>
+    <p:extLst>
+      <p:ext uri="{BB962C8B-B14F-4D97-AF65-F5344CB8AC3E}">
+        <p14:creationId xmlns:p14="http://schemas.microsoft.com/office/powerpoint/2010/main" val="349991724"/>
+      </p:ext>
+    </p:extLst>
+  </p:cSld>
+  <p:clrMapOvr>
+    <a:masterClrMapping/>
+  </p:clrMapOvr>
+</p:sld>
+</file>
+
+<file path=ppt/slides/slide5.xml><?xml version="1.0" encoding="utf-8"?>
+<p:sld xmlns:a="http://schemas.openxmlformats.org/drawingml/2006/main" xmlns:r="http://schemas.openxmlformats.org/officeDocument/2006/relationships" xmlns:p="http://schemas.openxmlformats.org/presentationml/2006/main">
+  <p:cSld>
+    <p:bg>
+      <p:bgPr>
+        <a:blipFill dpi="0" rotWithShape="1">
+          <a:blip r:embed="rId3">
+            <a:lum/>
+          </a:blip>
+          <a:srcRect/>
+          <a:stretch>
+            <a:fillRect/>
+          </a:stretch>
+        </a:blipFill>
+        <a:effectLst/>
+      </p:bgPr>
+    </p:bg>
+    <p:spTree>
+      <p:nvGrpSpPr>
+        <p:cNvPr id="1" name=""/>
+        <p:cNvGrpSpPr/>
+        <p:nvPr/>
+      </p:nvGrpSpPr>
+      <p:grpSpPr>
+        <a:xfrm>
+          <a:off x="0" y="0"/>
+          <a:ext cx="0" cy="0"/>
+          <a:chOff x="0" y="0"/>
+          <a:chExt cx="0" cy="0"/>
+        </a:xfrm>
+      </p:grpSpPr>
+      <p:sp>
+        <p:nvSpPr>
+          <p:cNvPr id="2" name="pole tekstowe 1">
+            <a:extLst>
+              <a:ext uri="{FF2B5EF4-FFF2-40B4-BE49-F238E27FC236}">
+                <a16:creationId xmlns:a16="http://schemas.microsoft.com/office/drawing/2014/main" id="{93F3B43B-190C-4F5E-99E0-D00D0FA5B8EF}"/>
+              </a:ext>
+            </a:extLst>
+          </p:cNvPr>
+          <p:cNvSpPr txBox="1"/>
+          <p:nvPr/>
+        </p:nvSpPr>
+        <p:spPr>
+          <a:xfrm>
+            <a:off x="990600" y="304800"/>
+            <a:ext cx="4733925" cy="461665"/>
+          </a:xfrm>
+          <a:prstGeom prst="rect">
+            <a:avLst/>
+          </a:prstGeom>
+          <a:noFill/>
+        </p:spPr>
+        <p:txBody>
+          <a:bodyPr wrap="square" rtlCol="0">
+            <a:spAutoFit/>
+          </a:bodyPr>
+          <a:lstStyle/>
+          <a:p>
+            <a:r>
+              <a:rPr lang="pl-PL" sz="2400" dirty="0">
+                <a:solidFill>
+                  <a:srgbClr val="F36B3A"/>
+                </a:solidFill>
+                <a:latin typeface="Roboto Light" panose="02000000000000000000" pitchFamily="2" charset="0"/>
+                <a:ea typeface="Roboto Light" panose="02000000000000000000" pitchFamily="2" charset="0"/>
+              </a:rPr>
+              <a:t>WSPÓŁDZIELENIE KOLEKCJI</a:t>
+            </a:r>
+          </a:p>
+        </p:txBody>
+      </p:sp>
+      <p:sp>
+        <p:nvSpPr>
+          <p:cNvPr id="4" name="pole tekstowe 3">
+            <a:extLst>
+              <a:ext uri="{FF2B5EF4-FFF2-40B4-BE49-F238E27FC236}">
+                <a16:creationId xmlns:a16="http://schemas.microsoft.com/office/drawing/2014/main" id="{F03D58CA-620E-4363-8705-FE4177F32A5B}"/>
+              </a:ext>
+            </a:extLst>
+          </p:cNvPr>
+          <p:cNvSpPr txBox="1"/>
+          <p:nvPr/>
+        </p:nvSpPr>
+        <p:spPr>
+          <a:xfrm>
+            <a:off x="352424" y="1205724"/>
+            <a:ext cx="4476752" cy="1754326"/>
+          </a:xfrm>
+          <a:prstGeom prst="rect">
+            <a:avLst/>
+          </a:prstGeom>
+          <a:noFill/>
+        </p:spPr>
+        <p:txBody>
+          <a:bodyPr wrap="square" rtlCol="0">
+            <a:spAutoFit/>
+          </a:bodyPr>
+          <a:lstStyle/>
+          <a:p>
+            <a:r>
+              <a:rPr lang="pl-PL" sz="3600" dirty="0">
+                <a:solidFill>
+                  <a:srgbClr val="F8F8F8"/>
+                </a:solidFill>
+                <a:latin typeface="Roboto Medium" panose="02000000000000000000" pitchFamily="2" charset="0"/>
+                <a:ea typeface="Roboto Medium" panose="02000000000000000000" pitchFamily="2" charset="0"/>
+              </a:rPr>
+              <a:t>Sposoby współdzielenia kolekcji</a:t>
+            </a:r>
+          </a:p>
+        </p:txBody>
+      </p:sp>
+      <p:pic>
+        <p:nvPicPr>
+          <p:cNvPr id="5" name="Obraz 4">
+            <a:extLst>
+              <a:ext uri="{FF2B5EF4-FFF2-40B4-BE49-F238E27FC236}">
+                <a16:creationId xmlns:a16="http://schemas.microsoft.com/office/drawing/2014/main" id="{E4AB1CE9-CBDC-45B7-97B8-8D8CAF425DC3}"/>
+              </a:ext>
+            </a:extLst>
+          </p:cNvPr>
+          <p:cNvPicPr>
+            <a:picLocks noChangeAspect="1"/>
+          </p:cNvPicPr>
+          <p:nvPr/>
+        </p:nvPicPr>
+        <p:blipFill>
+          <a:blip r:embed="rId4">
+            <a:extLst>
+              <a:ext uri="{28A0092B-C50C-407E-A947-70E740481C1C}">
+                <a14:useLocalDpi xmlns:a14="http://schemas.microsoft.com/office/drawing/2010/main" val="0"/>
+              </a:ext>
+            </a:extLst>
+          </a:blip>
+          <a:stretch>
+            <a:fillRect/>
+          </a:stretch>
+        </p:blipFill>
+        <p:spPr>
+          <a:xfrm>
+            <a:off x="371474" y="3234834"/>
+            <a:ext cx="272061" cy="266828"/>
+          </a:xfrm>
+          <a:prstGeom prst="rect">
+            <a:avLst/>
+          </a:prstGeom>
+        </p:spPr>
+      </p:pic>
+      <p:pic>
+        <p:nvPicPr>
+          <p:cNvPr id="6" name="Obraz 5">
+            <a:extLst>
+              <a:ext uri="{FF2B5EF4-FFF2-40B4-BE49-F238E27FC236}">
+                <a16:creationId xmlns:a16="http://schemas.microsoft.com/office/drawing/2014/main" id="{A1A380B2-CBA8-448F-A5F4-76B684A49C6D}"/>
+              </a:ext>
+            </a:extLst>
+          </p:cNvPr>
+          <p:cNvPicPr>
+            <a:picLocks noChangeAspect="1"/>
+          </p:cNvPicPr>
+          <p:nvPr/>
+        </p:nvPicPr>
+        <p:blipFill>
+          <a:blip r:embed="rId5">
+            <a:extLst>
+              <a:ext uri="{28A0092B-C50C-407E-A947-70E740481C1C}">
+                <a14:useLocalDpi xmlns:a14="http://schemas.microsoft.com/office/drawing/2010/main" val="0"/>
+              </a:ext>
+            </a:extLst>
+          </a:blip>
+          <a:stretch>
+            <a:fillRect/>
+          </a:stretch>
+        </p:blipFill>
+        <p:spPr>
+          <a:xfrm>
+            <a:off x="339089" y="4049043"/>
+            <a:ext cx="303277" cy="303277"/>
+          </a:xfrm>
+          <a:prstGeom prst="rect">
+            <a:avLst/>
+          </a:prstGeom>
+        </p:spPr>
+      </p:pic>
+      <p:pic>
+        <p:nvPicPr>
+          <p:cNvPr id="7" name="Obraz 6">
+            <a:extLst>
+              <a:ext uri="{FF2B5EF4-FFF2-40B4-BE49-F238E27FC236}">
+                <a16:creationId xmlns:a16="http://schemas.microsoft.com/office/drawing/2014/main" id="{CF61F277-115A-4A58-BCE3-09A75BC2FB68}"/>
+              </a:ext>
+            </a:extLst>
+          </p:cNvPr>
+          <p:cNvPicPr>
+            <a:picLocks noChangeAspect="1"/>
+          </p:cNvPicPr>
+          <p:nvPr/>
+        </p:nvPicPr>
+        <p:blipFill>
+          <a:blip r:embed="rId6">
+            <a:extLst>
+              <a:ext uri="{28A0092B-C50C-407E-A947-70E740481C1C}">
+                <a14:useLocalDpi xmlns:a14="http://schemas.microsoft.com/office/drawing/2010/main" val="0"/>
+              </a:ext>
+            </a:extLst>
+          </a:blip>
+          <a:stretch>
+            <a:fillRect/>
+          </a:stretch>
+        </p:blipFill>
+        <p:spPr>
+          <a:xfrm>
+            <a:off x="352424" y="4922304"/>
+            <a:ext cx="289942" cy="285858"/>
+          </a:xfrm>
+          <a:prstGeom prst="rect">
+            <a:avLst/>
+          </a:prstGeom>
+        </p:spPr>
+      </p:pic>
+      <p:sp>
+        <p:nvSpPr>
+          <p:cNvPr id="9" name="pole tekstowe 8">
+            <a:extLst>
+              <a:ext uri="{FF2B5EF4-FFF2-40B4-BE49-F238E27FC236}">
+                <a16:creationId xmlns:a16="http://schemas.microsoft.com/office/drawing/2014/main" id="{07F4910C-8F52-4153-A3A6-4C257C05983B}"/>
+              </a:ext>
+            </a:extLst>
+          </p:cNvPr>
+          <p:cNvSpPr txBox="1"/>
+          <p:nvPr/>
+        </p:nvSpPr>
+        <p:spPr>
+          <a:xfrm>
+            <a:off x="899531" y="3081115"/>
+            <a:ext cx="4034420" cy="646331"/>
+          </a:xfrm>
+          <a:prstGeom prst="rect">
+            <a:avLst/>
+          </a:prstGeom>
+          <a:noFill/>
+        </p:spPr>
+        <p:txBody>
+          <a:bodyPr wrap="square" rtlCol="0">
+            <a:spAutoFit/>
+          </a:bodyPr>
+          <a:lstStyle/>
+          <a:p>
+            <a:pPr algn="just"/>
+            <a:r>
+              <a:rPr lang="pl-PL" dirty="0">
+                <a:solidFill>
+                  <a:srgbClr val="F8F8F8"/>
+                </a:solidFill>
+                <a:latin typeface="Roboto Medium" panose="02000000000000000000" pitchFamily="2" charset="0"/>
+                <a:ea typeface="Roboto Medium" panose="02000000000000000000" pitchFamily="2" charset="0"/>
+              </a:rPr>
+              <a:t>Współdzielenie kolekcji pomiędzy obszarami roboczymi</a:t>
+            </a:r>
+          </a:p>
+        </p:txBody>
+      </p:sp>
+      <p:sp>
+        <p:nvSpPr>
+          <p:cNvPr id="10" name="pole tekstowe 9">
+            <a:extLst>
+              <a:ext uri="{FF2B5EF4-FFF2-40B4-BE49-F238E27FC236}">
+                <a16:creationId xmlns:a16="http://schemas.microsoft.com/office/drawing/2014/main" id="{DA83E715-432D-4F00-BDE7-6329C3E909AE}"/>
+              </a:ext>
+            </a:extLst>
+          </p:cNvPr>
+          <p:cNvSpPr txBox="1"/>
+          <p:nvPr/>
+        </p:nvSpPr>
+        <p:spPr>
+          <a:xfrm>
+            <a:off x="927590" y="3871950"/>
+            <a:ext cx="3901585" cy="646331"/>
+          </a:xfrm>
+          <a:prstGeom prst="rect">
+            <a:avLst/>
+          </a:prstGeom>
+          <a:noFill/>
+        </p:spPr>
+        <p:txBody>
+          <a:bodyPr wrap="square" rtlCol="0">
+            <a:spAutoFit/>
+          </a:bodyPr>
+          <a:lstStyle/>
+          <a:p>
+            <a:pPr algn="just"/>
+            <a:r>
+              <a:rPr lang="pl-PL" dirty="0">
+                <a:solidFill>
+                  <a:srgbClr val="F8F8F8"/>
+                </a:solidFill>
+                <a:latin typeface="Roboto Medium" panose="02000000000000000000" pitchFamily="2" charset="0"/>
+                <a:ea typeface="Roboto Medium" panose="02000000000000000000" pitchFamily="2" charset="0"/>
+              </a:rPr>
+              <a:t>Osadzanie na stronie przycisku „Run in </a:t>
+            </a:r>
+            <a:r>
+              <a:rPr lang="pl-PL" dirty="0" err="1">
+                <a:solidFill>
+                  <a:srgbClr val="F8F8F8"/>
+                </a:solidFill>
+                <a:latin typeface="Roboto Medium" panose="02000000000000000000" pitchFamily="2" charset="0"/>
+                <a:ea typeface="Roboto Medium" panose="02000000000000000000" pitchFamily="2" charset="0"/>
+              </a:rPr>
+              <a:t>Postman</a:t>
+            </a:r>
+            <a:r>
+              <a:rPr lang="pl-PL" dirty="0">
+                <a:solidFill>
+                  <a:srgbClr val="F8F8F8"/>
+                </a:solidFill>
+                <a:latin typeface="Roboto Medium" panose="02000000000000000000" pitchFamily="2" charset="0"/>
+                <a:ea typeface="Roboto Medium" panose="02000000000000000000" pitchFamily="2" charset="0"/>
+              </a:rPr>
+              <a:t>”</a:t>
+            </a:r>
+          </a:p>
+        </p:txBody>
+      </p:sp>
+      <p:sp>
+        <p:nvSpPr>
+          <p:cNvPr id="11" name="pole tekstowe 10">
+            <a:extLst>
+              <a:ext uri="{FF2B5EF4-FFF2-40B4-BE49-F238E27FC236}">
+                <a16:creationId xmlns:a16="http://schemas.microsoft.com/office/drawing/2014/main" id="{76B17B85-0911-4909-85B3-DDECF7FFDF0D}"/>
+              </a:ext>
+            </a:extLst>
+          </p:cNvPr>
+          <p:cNvSpPr txBox="1"/>
+          <p:nvPr/>
+        </p:nvSpPr>
+        <p:spPr>
+          <a:xfrm>
+            <a:off x="737719" y="4849065"/>
+            <a:ext cx="4034420" cy="369332"/>
+          </a:xfrm>
+          <a:prstGeom prst="rect">
+            <a:avLst/>
+          </a:prstGeom>
+          <a:noFill/>
+        </p:spPr>
+        <p:txBody>
+          <a:bodyPr wrap="square" rtlCol="0">
+            <a:spAutoFit/>
+          </a:bodyPr>
+          <a:lstStyle/>
+          <a:p>
+            <a:r>
+              <a:rPr lang="pl-PL" dirty="0">
+                <a:solidFill>
+                  <a:srgbClr val="F8F8F8"/>
+                </a:solidFill>
+                <a:latin typeface="Roboto Medium" panose="02000000000000000000" pitchFamily="2" charset="0"/>
+                <a:ea typeface="Roboto Medium" panose="02000000000000000000" pitchFamily="2" charset="0"/>
+              </a:rPr>
+              <a:t>Wygenerowanie publicznego linku</a:t>
+            </a:r>
+          </a:p>
+        </p:txBody>
+      </p:sp>
+      <p:pic>
+        <p:nvPicPr>
+          <p:cNvPr id="12" name="Obraz 11">
+            <a:extLst>
+              <a:ext uri="{FF2B5EF4-FFF2-40B4-BE49-F238E27FC236}">
+                <a16:creationId xmlns:a16="http://schemas.microsoft.com/office/drawing/2014/main" id="{53C59A9B-41D7-42D0-9775-267161B2226D}"/>
+              </a:ext>
+            </a:extLst>
+          </p:cNvPr>
+          <p:cNvPicPr>
+            <a:picLocks noChangeAspect="1"/>
+          </p:cNvPicPr>
+          <p:nvPr/>
+        </p:nvPicPr>
+        <p:blipFill>
+          <a:blip r:embed="rId7">
+            <a:extLst>
+              <a:ext uri="{28A0092B-C50C-407E-A947-70E740481C1C}">
+                <a14:useLocalDpi xmlns:a14="http://schemas.microsoft.com/office/drawing/2010/main" val="0"/>
+              </a:ext>
+            </a:extLst>
+          </a:blip>
+          <a:stretch>
+            <a:fillRect/>
+          </a:stretch>
+        </p:blipFill>
+        <p:spPr>
+          <a:xfrm>
+            <a:off x="352424" y="5625383"/>
+            <a:ext cx="292609" cy="292609"/>
+          </a:xfrm>
+          <a:prstGeom prst="rect">
+            <a:avLst/>
+          </a:prstGeom>
+        </p:spPr>
+      </p:pic>
+      <p:sp>
+        <p:nvSpPr>
+          <p:cNvPr id="13" name="pole tekstowe 12">
+            <a:extLst>
+              <a:ext uri="{FF2B5EF4-FFF2-40B4-BE49-F238E27FC236}">
+                <a16:creationId xmlns:a16="http://schemas.microsoft.com/office/drawing/2014/main" id="{22033922-483A-4A9C-8B2B-90989B485F18}"/>
+              </a:ext>
+            </a:extLst>
+          </p:cNvPr>
+          <p:cNvSpPr txBox="1"/>
+          <p:nvPr/>
+        </p:nvSpPr>
+        <p:spPr>
+          <a:xfrm>
+            <a:off x="899531" y="5587021"/>
+            <a:ext cx="2958094" cy="369332"/>
+          </a:xfrm>
+          <a:prstGeom prst="rect">
+            <a:avLst/>
+          </a:prstGeom>
+          <a:noFill/>
+        </p:spPr>
+        <p:txBody>
+          <a:bodyPr wrap="square" rtlCol="0">
+            <a:spAutoFit/>
+          </a:bodyPr>
+          <a:lstStyle/>
+          <a:p>
+            <a:pPr algn="just"/>
+            <a:r>
+              <a:rPr lang="pl-PL" dirty="0">
+                <a:solidFill>
+                  <a:srgbClr val="F8F8F8"/>
+                </a:solidFill>
+                <a:latin typeface="Roboto Medium" panose="02000000000000000000" pitchFamily="2" charset="0"/>
+                <a:ea typeface="Roboto Medium" panose="02000000000000000000" pitchFamily="2" charset="0"/>
+              </a:rPr>
+              <a:t>Eksport do pliku JSON</a:t>
+            </a:r>
+          </a:p>
+        </p:txBody>
+      </p:sp>
+      <p:pic>
+        <p:nvPicPr>
+          <p:cNvPr id="3" name="Obraz 2">
+            <a:extLst>
+              <a:ext uri="{FF2B5EF4-FFF2-40B4-BE49-F238E27FC236}">
+                <a16:creationId xmlns:a16="http://schemas.microsoft.com/office/drawing/2014/main" id="{9C5D007D-B1C3-498E-A9A1-72B0CAB96193}"/>
+              </a:ext>
+            </a:extLst>
+          </p:cNvPr>
+          <p:cNvPicPr>
+            <a:picLocks noChangeAspect="1"/>
+          </p:cNvPicPr>
+          <p:nvPr/>
+        </p:nvPicPr>
+        <p:blipFill>
+          <a:blip r:embed="rId8"/>
+          <a:stretch>
+            <a:fillRect/>
+          </a:stretch>
+        </p:blipFill>
+        <p:spPr>
+          <a:xfrm>
+            <a:off x="5085172" y="1205724"/>
+            <a:ext cx="7028187" cy="3297325"/>
+          </a:xfrm>
+          <a:prstGeom prst="rect">
+            <a:avLst/>
+          </a:prstGeom>
+        </p:spPr>
+      </p:pic>
+      <p:pic>
+        <p:nvPicPr>
+          <p:cNvPr id="14" name="Obraz 13">
+            <a:extLst>
+              <a:ext uri="{FF2B5EF4-FFF2-40B4-BE49-F238E27FC236}">
+                <a16:creationId xmlns:a16="http://schemas.microsoft.com/office/drawing/2014/main" id="{7571377A-9A74-480B-A119-FF68B2887155}"/>
+              </a:ext>
+            </a:extLst>
+          </p:cNvPr>
+          <p:cNvPicPr>
+            <a:picLocks noChangeAspect="1"/>
+          </p:cNvPicPr>
+          <p:nvPr/>
+        </p:nvPicPr>
+        <p:blipFill>
+          <a:blip r:embed="rId9"/>
+          <a:stretch>
+            <a:fillRect/>
+          </a:stretch>
+        </p:blipFill>
+        <p:spPr>
+          <a:xfrm>
+            <a:off x="5085172" y="4741174"/>
+            <a:ext cx="2069488" cy="1343428"/>
+          </a:xfrm>
+          <a:prstGeom prst="rect">
+            <a:avLst/>
+          </a:prstGeom>
+        </p:spPr>
+      </p:pic>
+    </p:spTree>
+    <p:extLst>
+      <p:ext uri="{BB962C8B-B14F-4D97-AF65-F5344CB8AC3E}">
+        <p14:creationId xmlns:p14="http://schemas.microsoft.com/office/powerpoint/2010/main" val="2197417730"/>
+      </p:ext>
+    </p:extLst>
+  </p:cSld>
+  <p:clrMapOvr>
+    <a:masterClrMapping/>
+  </p:clrMapOvr>
+</p:sld>
+</file>
+
+<file path=ppt/slides/slide6.xml><?xml version="1.0" encoding="utf-8"?>
 <p:sld xmlns:a="http://schemas.openxmlformats.org/drawingml/2006/main" xmlns:r="http://schemas.openxmlformats.org/officeDocument/2006/relationships" xmlns:p="http://schemas.openxmlformats.org/presentationml/2006/main">
   <p:cSld>
     <p:bg>
@@ -4844,4 +6659,299 @@
     </a:ext>
   </a:extLst>
 </a:theme>
+</file>
+
+<file path=ppt/theme/theme2.xml><?xml version="1.0" encoding="utf-8"?>
+<a:theme xmlns:a="http://schemas.openxmlformats.org/drawingml/2006/main" name="Motyw pakietu Office">
+  <a:themeElements>
+    <a:clrScheme name="Pakiet Office">
+      <a:dk1>
+        <a:sysClr val="windowText" lastClr="000000"/>
+      </a:dk1>
+      <a:lt1>
+        <a:sysClr val="window" lastClr="FFFFFF"/>
+      </a:lt1>
+      <a:dk2>
+        <a:srgbClr val="44546A"/>
+      </a:dk2>
+      <a:lt2>
+        <a:srgbClr val="E7E6E6"/>
+      </a:lt2>
+      <a:accent1>
+        <a:srgbClr val="4472C4"/>
+      </a:accent1>
+      <a:accent2>
+        <a:srgbClr val="ED7D31"/>
+      </a:accent2>
+      <a:accent3>
+        <a:srgbClr val="A5A5A5"/>
+      </a:accent3>
+      <a:accent4>
+        <a:srgbClr val="FFC000"/>
+      </a:accent4>
+      <a:accent5>
+        <a:srgbClr val="5B9BD5"/>
+      </a:accent5>
+      <a:accent6>
+        <a:srgbClr val="70AD47"/>
+      </a:accent6>
+      <a:hlink>
+        <a:srgbClr val="0563C1"/>
+      </a:hlink>
+      <a:folHlink>
+        <a:srgbClr val="954F72"/>
+      </a:folHlink>
+    </a:clrScheme>
+    <a:fontScheme name="Pakiet Office">
+      <a:majorFont>
+        <a:latin typeface="Calibri Light" panose="020F0302020204030204"/>
+        <a:ea typeface=""/>
+        <a:cs typeface=""/>
+        <a:font script="Jpan" typeface="游ゴシック Light"/>
+        <a:font script="Hang" typeface="맑은 고딕"/>
+        <a:font script="Hans" typeface="等线 Light"/>
+        <a:font script="Hant" typeface="新細明體"/>
+        <a:font script="Arab" typeface="Times New Roman"/>
+        <a:font script="Hebr" typeface="Times New Roman"/>
+        <a:font script="Thai" typeface="Angsana New"/>
+        <a:font script="Ethi" typeface="Nyala"/>
+        <a:font script="Beng" typeface="Vrinda"/>
+        <a:font script="Gujr" typeface="Shruti"/>
+        <a:font script="Khmr" typeface="MoolBoran"/>
+        <a:font script="Knda" typeface="Tunga"/>
+        <a:font script="Guru" typeface="Raavi"/>
+        <a:font script="Cans" typeface="Euphemia"/>
+        <a:font script="Cher" typeface="Plantagenet Cherokee"/>
+        <a:font script="Yiii" typeface="Microsoft Yi Baiti"/>
+        <a:font script="Tibt" typeface="Microsoft Himalaya"/>
+        <a:font script="Thaa" typeface="MV Boli"/>
+        <a:font script="Deva" typeface="Mangal"/>
+        <a:font script="Telu" typeface="Gautami"/>
+        <a:font script="Taml" typeface="Latha"/>
+        <a:font script="Syrc" typeface="Estrangelo Edessa"/>
+        <a:font script="Orya" typeface="Kalinga"/>
+        <a:font script="Mlym" typeface="Kartika"/>
+        <a:font script="Laoo" typeface="DokChampa"/>
+        <a:font script="Sinh" typeface="Iskoola Pota"/>
+        <a:font script="Mong" typeface="Mongolian Baiti"/>
+        <a:font script="Viet" typeface="Times New Roman"/>
+        <a:font script="Uigh" typeface="Microsoft Uighur"/>
+        <a:font script="Geor" typeface="Sylfaen"/>
+        <a:font script="Armn" typeface="Arial"/>
+        <a:font script="Bugi" typeface="Leelawadee UI"/>
+        <a:font script="Bopo" typeface="Microsoft JhengHei"/>
+        <a:font script="Java" typeface="Javanese Text"/>
+        <a:font script="Lisu" typeface="Segoe UI"/>
+        <a:font script="Mymr" typeface="Myanmar Text"/>
+        <a:font script="Nkoo" typeface="Ebrima"/>
+        <a:font script="Olck" typeface="Nirmala UI"/>
+        <a:font script="Osma" typeface="Ebrima"/>
+        <a:font script="Phag" typeface="Phagspa"/>
+        <a:font script="Syrn" typeface="Estrangelo Edessa"/>
+        <a:font script="Syrj" typeface="Estrangelo Edessa"/>
+        <a:font script="Syre" typeface="Estrangelo Edessa"/>
+        <a:font script="Sora" typeface="Nirmala UI"/>
+        <a:font script="Tale" typeface="Microsoft Tai Le"/>
+        <a:font script="Talu" typeface="Microsoft New Tai Lue"/>
+        <a:font script="Tfng" typeface="Ebrima"/>
+      </a:majorFont>
+      <a:minorFont>
+        <a:latin typeface="Calibri" panose="020F0502020204030204"/>
+        <a:ea typeface=""/>
+        <a:cs typeface=""/>
+        <a:font script="Jpan" typeface="游ゴシック"/>
+        <a:font script="Hang" typeface="맑은 고딕"/>
+        <a:font script="Hans" typeface="等线"/>
+        <a:font script="Hant" typeface="新細明體"/>
+        <a:font script="Arab" typeface="Arial"/>
+        <a:font script="Hebr" typeface="Arial"/>
+        <a:font script="Thai" typeface="Cordia New"/>
+        <a:font script="Ethi" typeface="Nyala"/>
+        <a:font script="Beng" typeface="Vrinda"/>
+        <a:font script="Gujr" typeface="Shruti"/>
+        <a:font script="Khmr" typeface="DaunPenh"/>
+        <a:font script="Knda" typeface="Tunga"/>
+        <a:font script="Guru" typeface="Raavi"/>
+        <a:font script="Cans" typeface="Euphemia"/>
+        <a:font script="Cher" typeface="Plantagenet Cherokee"/>
+        <a:font script="Yiii" typeface="Microsoft Yi Baiti"/>
+        <a:font script="Tibt" typeface="Microsoft Himalaya"/>
+        <a:font script="Thaa" typeface="MV Boli"/>
+        <a:font script="Deva" typeface="Mangal"/>
+        <a:font script="Telu" typeface="Gautami"/>
+        <a:font script="Taml" typeface="Latha"/>
+        <a:font script="Syrc" typeface="Estrangelo Edessa"/>
+        <a:font script="Orya" typeface="Kalinga"/>
+        <a:font script="Mlym" typeface="Kartika"/>
+        <a:font script="Laoo" typeface="DokChampa"/>
+        <a:font script="Sinh" typeface="Iskoola Pota"/>
+        <a:font script="Mong" typeface="Mongolian Baiti"/>
+        <a:font script="Viet" typeface="Arial"/>
+        <a:font script="Uigh" typeface="Microsoft Uighur"/>
+        <a:font script="Geor" typeface="Sylfaen"/>
+        <a:font script="Armn" typeface="Arial"/>
+        <a:font script="Bugi" typeface="Leelawadee UI"/>
+        <a:font script="Bopo" typeface="Microsoft JhengHei"/>
+        <a:font script="Java" typeface="Javanese Text"/>
+        <a:font script="Lisu" typeface="Segoe UI"/>
+        <a:font script="Mymr" typeface="Myanmar Text"/>
+        <a:font script="Nkoo" typeface="Ebrima"/>
+        <a:font script="Olck" typeface="Nirmala UI"/>
+        <a:font script="Osma" typeface="Ebrima"/>
+        <a:font script="Phag" typeface="Phagspa"/>
+        <a:font script="Syrn" typeface="Estrangelo Edessa"/>
+        <a:font script="Syrj" typeface="Estrangelo Edessa"/>
+        <a:font script="Syre" typeface="Estrangelo Edessa"/>
+        <a:font script="Sora" typeface="Nirmala UI"/>
+        <a:font script="Tale" typeface="Microsoft Tai Le"/>
+        <a:font script="Talu" typeface="Microsoft New Tai Lue"/>
+        <a:font script="Tfng" typeface="Ebrima"/>
+      </a:minorFont>
+    </a:fontScheme>
+    <a:fmtScheme name="Pakiet Office">
+      <a:fillStyleLst>
+        <a:solidFill>
+          <a:schemeClr val="phClr"/>
+        </a:solidFill>
+        <a:gradFill rotWithShape="1">
+          <a:gsLst>
+            <a:gs pos="0">
+              <a:schemeClr val="phClr">
+                <a:lumMod val="110000"/>
+                <a:satMod val="105000"/>
+                <a:tint val="67000"/>
+              </a:schemeClr>
+            </a:gs>
+            <a:gs pos="50000">
+              <a:schemeClr val="phClr">
+                <a:lumMod val="105000"/>
+                <a:satMod val="103000"/>
+                <a:tint val="73000"/>
+              </a:schemeClr>
+            </a:gs>
+            <a:gs pos="100000">
+              <a:schemeClr val="phClr">
+                <a:lumMod val="105000"/>
+                <a:satMod val="109000"/>
+                <a:tint val="81000"/>
+              </a:schemeClr>
+            </a:gs>
+          </a:gsLst>
+          <a:lin ang="5400000" scaled="0"/>
+        </a:gradFill>
+        <a:gradFill rotWithShape="1">
+          <a:gsLst>
+            <a:gs pos="0">
+              <a:schemeClr val="phClr">
+                <a:satMod val="103000"/>
+                <a:lumMod val="102000"/>
+                <a:tint val="94000"/>
+              </a:schemeClr>
+            </a:gs>
+            <a:gs pos="50000">
+              <a:schemeClr val="phClr">
+                <a:satMod val="110000"/>
+                <a:lumMod val="100000"/>
+                <a:shade val="100000"/>
+              </a:schemeClr>
+            </a:gs>
+            <a:gs pos="100000">
+              <a:schemeClr val="phClr">
+                <a:lumMod val="99000"/>
+                <a:satMod val="120000"/>
+                <a:shade val="78000"/>
+              </a:schemeClr>
+            </a:gs>
+          </a:gsLst>
+          <a:lin ang="5400000" scaled="0"/>
+        </a:gradFill>
+      </a:fillStyleLst>
+      <a:lnStyleLst>
+        <a:ln w="6350" cap="flat" cmpd="sng" algn="ctr">
+          <a:solidFill>
+            <a:schemeClr val="phClr"/>
+          </a:solidFill>
+          <a:prstDash val="solid"/>
+          <a:miter lim="800000"/>
+        </a:ln>
+        <a:ln w="12700" cap="flat" cmpd="sng" algn="ctr">
+          <a:solidFill>
+            <a:schemeClr val="phClr"/>
+          </a:solidFill>
+          <a:prstDash val="solid"/>
+          <a:miter lim="800000"/>
+        </a:ln>
+        <a:ln w="19050" cap="flat" cmpd="sng" algn="ctr">
+          <a:solidFill>
+            <a:schemeClr val="phClr"/>
+          </a:solidFill>
+          <a:prstDash val="solid"/>
+          <a:miter lim="800000"/>
+        </a:ln>
+      </a:lnStyleLst>
+      <a:effectStyleLst>
+        <a:effectStyle>
+          <a:effectLst/>
+        </a:effectStyle>
+        <a:effectStyle>
+          <a:effectLst/>
+        </a:effectStyle>
+        <a:effectStyle>
+          <a:effectLst>
+            <a:outerShdw blurRad="57150" dist="19050" dir="5400000" algn="ctr" rotWithShape="0">
+              <a:srgbClr val="000000">
+                <a:alpha val="63000"/>
+              </a:srgbClr>
+            </a:outerShdw>
+          </a:effectLst>
+        </a:effectStyle>
+      </a:effectStyleLst>
+      <a:bgFillStyleLst>
+        <a:solidFill>
+          <a:schemeClr val="phClr"/>
+        </a:solidFill>
+        <a:solidFill>
+          <a:schemeClr val="phClr">
+            <a:tint val="95000"/>
+            <a:satMod val="170000"/>
+          </a:schemeClr>
+        </a:solidFill>
+        <a:gradFill rotWithShape="1">
+          <a:gsLst>
+            <a:gs pos="0">
+              <a:schemeClr val="phClr">
+                <a:tint val="93000"/>
+                <a:satMod val="150000"/>
+                <a:shade val="98000"/>
+                <a:lumMod val="102000"/>
+              </a:schemeClr>
+            </a:gs>
+            <a:gs pos="50000">
+              <a:schemeClr val="phClr">
+                <a:tint val="98000"/>
+                <a:satMod val="130000"/>
+                <a:shade val="90000"/>
+                <a:lumMod val="103000"/>
+              </a:schemeClr>
+            </a:gs>
+            <a:gs pos="100000">
+              <a:schemeClr val="phClr">
+                <a:shade val="63000"/>
+                <a:satMod val="120000"/>
+              </a:schemeClr>
+            </a:gs>
+          </a:gsLst>
+          <a:lin ang="5400000" scaled="0"/>
+        </a:gradFill>
+      </a:bgFillStyleLst>
+    </a:fmtScheme>
+  </a:themeElements>
+  <a:objectDefaults/>
+  <a:extraClrSchemeLst/>
+  <a:extLst>
+    <a:ext uri="{05A4C25C-085E-4340-85A3-A5531E510DB2}">
+      <thm15:themeFamily xmlns:thm15="http://schemas.microsoft.com/office/thememl/2012/main" name="Office Theme" id="{62F939B6-93AF-4DB8-9C6B-D6C7DFDC589F}" vid="{4A3C46E8-61CC-4603-A589-7422A47A8E4A}"/>
+    </a:ext>
+  </a:extLst>
+</a:theme>
 </file>
</xml_diff>